<commit_message>
add source code for dynamic array
</commit_message>
<xml_diff>
--- a/slides/datastructures/dynamic_array/Arrays.pptx
+++ b/slides/datastructures/dynamic_array/Arrays.pptx
@@ -324,6 +324,11 @@
       </a:defRPr>
     </a:lvl9pPr>
   </p:defaultTextStyle>
+  <p:extLst>
+    <p:ext uri="{EFAFB233-063F-42B5-8137-9DF3F51BA10A}">
+      <p15:sldGuideLst xmlns:p15="http://schemas.microsoft.com/office/powerpoint/2012/main"/>
+    </p:ext>
+  </p:extLst>
 </p:presentation>
 </file>
 
@@ -570,17 +575,832 @@
           <a:lstStyle/>
           <a:p>
             <a:r>
-              <a:rPr dirty="0"/>
-              <a:t>Let’s talk about Arrays, probably the most used data structure, this is part 1 of 2 in the array videos. The reason the array is used so much is because it forms a fundamental building block for all other data structures, so we see it everywhere. With arrays and pointers alone </a:t>
-            </a:r>
-            <a:r>
-              <a:rPr dirty="0" err="1"/>
-              <a:t>i’m</a:t>
-            </a:r>
-            <a:r>
-              <a:rPr dirty="0"/>
-              <a:t> pretty sure you can construct just about any data structure.</a:t>
-            </a:r>
+              <a:rPr lang="en-US" dirty="0" err="1"/>
+              <a:t>今天我们来学习数组</a:t>
+            </a:r>
+            <a:r>
+              <a:rPr lang="zh-CN" altLang="en-US" dirty="0"/>
+              <a:t>，数组可能是最常用的数据结构。本部分内容会分成两小节课，这是第一节。</a:t>
+            </a:r>
+            <a:endParaRPr lang="en-US" altLang="zh-CN" dirty="0"/>
+          </a:p>
+          <a:p>
+            <a:endParaRPr lang="en-US" dirty="0"/>
+          </a:p>
+          <a:p>
+            <a:r>
+              <a:rPr lang="zh-CN" altLang="en-US" dirty="0"/>
+              <a:t>数组之所以用途广泛，几乎每个程序都可以看到它的影子，主要是因为它是支持其它数据结构的基础结构。基本上只需要数组和指针，你就可以构造出其它任意的数据结构。</a:t>
+            </a:r>
+            <a:endParaRPr lang="en-US" altLang="zh-CN" dirty="0"/>
+          </a:p>
+          <a:p>
+            <a:endParaRPr lang="en-US" dirty="0"/>
+          </a:p>
+          <a:p>
+            <a:endParaRPr dirty="0"/>
+          </a:p>
+        </p:txBody>
+      </p:sp>
+    </p:spTree>
+  </p:cSld>
+  <p:clrMapOvr>
+    <a:masterClrMapping/>
+  </p:clrMapOvr>
+</p:notes>
+</file>
+
+<file path=ppt/notesSlides/notesSlide10.xml><?xml version="1.0" encoding="utf-8"?>
+<p:notes xmlns:a="http://schemas.openxmlformats.org/drawingml/2006/main" xmlns:r="http://schemas.openxmlformats.org/officeDocument/2006/relationships" xmlns:p="http://schemas.openxmlformats.org/presentationml/2006/main">
+  <p:cSld>
+    <p:spTree>
+      <p:nvGrpSpPr>
+        <p:cNvPr id="1" name=""/>
+        <p:cNvGrpSpPr/>
+        <p:nvPr/>
+      </p:nvGrpSpPr>
+      <p:grpSpPr>
+        <a:xfrm>
+          <a:off x="0" y="0"/>
+          <a:ext cx="0" cy="0"/>
+          <a:chOff x="0" y="0"/>
+          <a:chExt cx="0" cy="0"/>
+        </a:xfrm>
+      </p:grpSpPr>
+      <p:sp>
+        <p:nvSpPr>
+          <p:cNvPr id="2" name="幻灯片图像占位符 1"/>
+          <p:cNvSpPr>
+            <a:spLocks noGrp="1" noRot="1" noChangeAspect="1"/>
+          </p:cNvSpPr>
+          <p:nvPr>
+            <p:ph type="sldImg"/>
+          </p:nvPr>
+        </p:nvSpPr>
+        <p:spPr/>
+      </p:sp>
+      <p:sp>
+        <p:nvSpPr>
+          <p:cNvPr id="3" name="备注占位符 2"/>
+          <p:cNvSpPr>
+            <a:spLocks noGrp="1"/>
+          </p:cNvSpPr>
+          <p:nvPr>
+            <p:ph type="body" idx="1"/>
+          </p:nvPr>
+        </p:nvSpPr>
+        <p:spPr/>
+        <p:txBody>
+          <a:bodyPr/>
+          <a:lstStyle/>
+          <a:p>
+            <a:r>
+              <a:rPr kumimoji="1" lang="zh-CN" altLang="en-US" dirty="0"/>
+              <a:t>再把第五个元素修改为</a:t>
+            </a:r>
+            <a:r>
+              <a:rPr kumimoji="1" lang="en-US" altLang="zh-CN" dirty="0"/>
+              <a:t>18</a:t>
+            </a:r>
+            <a:r>
+              <a:rPr kumimoji="1" lang="zh-CN" altLang="en-US" dirty="0"/>
+              <a:t>。</a:t>
+            </a:r>
+          </a:p>
+        </p:txBody>
+      </p:sp>
+    </p:spTree>
+    <p:extLst>
+      <p:ext uri="{BB962C8B-B14F-4D97-AF65-F5344CB8AC3E}">
+        <p14:creationId xmlns:p14="http://schemas.microsoft.com/office/powerpoint/2010/main" val="1111245383"/>
+      </p:ext>
+    </p:extLst>
+  </p:cSld>
+  <p:clrMapOvr>
+    <a:masterClrMapping/>
+  </p:clrMapOvr>
+</p:notes>
+</file>
+
+<file path=ppt/notesSlides/notesSlide11.xml><?xml version="1.0" encoding="utf-8"?>
+<p:notes xmlns:a="http://schemas.openxmlformats.org/drawingml/2006/main" xmlns:r="http://schemas.openxmlformats.org/officeDocument/2006/relationships" xmlns:p="http://schemas.openxmlformats.org/presentationml/2006/main">
+  <p:cSld>
+    <p:spTree>
+      <p:nvGrpSpPr>
+        <p:cNvPr id="1" name=""/>
+        <p:cNvGrpSpPr/>
+        <p:nvPr/>
+      </p:nvGrpSpPr>
+      <p:grpSpPr>
+        <a:xfrm>
+          <a:off x="0" y="0"/>
+          <a:ext cx="0" cy="0"/>
+          <a:chOff x="0" y="0"/>
+          <a:chExt cx="0" cy="0"/>
+        </a:xfrm>
+      </p:grpSpPr>
+      <p:sp>
+        <p:nvSpPr>
+          <p:cNvPr id="2" name="幻灯片图像占位符 1"/>
+          <p:cNvSpPr>
+            <a:spLocks noGrp="1" noRot="1" noChangeAspect="1"/>
+          </p:cNvSpPr>
+          <p:nvPr>
+            <p:ph type="sldImg"/>
+          </p:nvPr>
+        </p:nvSpPr>
+        <p:spPr/>
+      </p:sp>
+      <p:sp>
+        <p:nvSpPr>
+          <p:cNvPr id="3" name="备注占位符 2"/>
+          <p:cNvSpPr>
+            <a:spLocks noGrp="1"/>
+          </p:cNvSpPr>
+          <p:nvPr>
+            <p:ph type="body" idx="1"/>
+          </p:nvPr>
+        </p:nvSpPr>
+        <p:spPr/>
+        <p:txBody>
+          <a:bodyPr/>
+          <a:lstStyle/>
+          <a:p>
+            <a:r>
+              <a:rPr kumimoji="1" lang="zh-CN" altLang="en-US" dirty="0"/>
+              <a:t>再把第</a:t>
+            </a:r>
+            <a:r>
+              <a:rPr kumimoji="1" lang="en-US" altLang="zh-CN" dirty="0"/>
+              <a:t>6</a:t>
+            </a:r>
+            <a:r>
+              <a:rPr kumimoji="1" lang="zh-CN" altLang="en-US" dirty="0"/>
+              <a:t>个元素修改为</a:t>
+            </a:r>
+            <a:r>
+              <a:rPr kumimoji="1" lang="en-US" altLang="zh-CN" dirty="0"/>
+              <a:t>25</a:t>
+            </a:r>
+            <a:r>
+              <a:rPr kumimoji="1" lang="zh-CN" altLang="en-US" dirty="0"/>
+              <a:t>。很简单。</a:t>
+            </a:r>
+          </a:p>
+        </p:txBody>
+      </p:sp>
+    </p:spTree>
+    <p:extLst>
+      <p:ext uri="{BB962C8B-B14F-4D97-AF65-F5344CB8AC3E}">
+        <p14:creationId xmlns:p14="http://schemas.microsoft.com/office/powerpoint/2010/main" val="560813892"/>
+      </p:ext>
+    </p:extLst>
+  </p:cSld>
+  <p:clrMapOvr>
+    <a:masterClrMapping/>
+  </p:clrMapOvr>
+</p:notes>
+</file>
+
+<file path=ppt/notesSlides/notesSlide12.xml><?xml version="1.0" encoding="utf-8"?>
+<p:notes xmlns:a="http://schemas.openxmlformats.org/drawingml/2006/main" xmlns:r="http://schemas.openxmlformats.org/officeDocument/2006/relationships" xmlns:p="http://schemas.openxmlformats.org/presentationml/2006/main">
+  <p:cSld>
+    <p:spTree>
+      <p:nvGrpSpPr>
+        <p:cNvPr id="1" name=""/>
+        <p:cNvGrpSpPr/>
+        <p:nvPr/>
+      </p:nvGrpSpPr>
+      <p:grpSpPr>
+        <a:xfrm>
+          <a:off x="0" y="0"/>
+          <a:ext cx="0" cy="0"/>
+          <a:chOff x="0" y="0"/>
+          <a:chExt cx="0" cy="0"/>
+        </a:xfrm>
+      </p:grpSpPr>
+      <p:sp>
+        <p:nvSpPr>
+          <p:cNvPr id="2" name="幻灯片图像占位符 1"/>
+          <p:cNvSpPr>
+            <a:spLocks noGrp="1" noRot="1" noChangeAspect="1"/>
+          </p:cNvSpPr>
+          <p:nvPr>
+            <p:ph type="sldImg"/>
+          </p:nvPr>
+        </p:nvSpPr>
+        <p:spPr/>
+      </p:sp>
+      <p:sp>
+        <p:nvSpPr>
+          <p:cNvPr id="3" name="备注占位符 2"/>
+          <p:cNvSpPr>
+            <a:spLocks noGrp="1"/>
+          </p:cNvSpPr>
+          <p:nvPr>
+            <p:ph type="body" idx="1"/>
+          </p:nvPr>
+        </p:nvSpPr>
+        <p:spPr/>
+        <p:txBody>
+          <a:bodyPr/>
+          <a:lstStyle/>
+          <a:p>
+            <a:r>
+              <a:rPr kumimoji="1" lang="zh-CN" altLang="en-US" dirty="0"/>
+              <a:t>下面我们来看动态数组和操作。</a:t>
+            </a:r>
+          </a:p>
+        </p:txBody>
+      </p:sp>
+    </p:spTree>
+    <p:extLst>
+      <p:ext uri="{BB962C8B-B14F-4D97-AF65-F5344CB8AC3E}">
+        <p14:creationId xmlns:p14="http://schemas.microsoft.com/office/powerpoint/2010/main" val="3115186014"/>
+      </p:ext>
+    </p:extLst>
+  </p:cSld>
+  <p:clrMapOvr>
+    <a:masterClrMapping/>
+  </p:clrMapOvr>
+</p:notes>
+</file>
+
+<file path=ppt/notesSlides/notesSlide13.xml><?xml version="1.0" encoding="utf-8"?>
+<p:notes xmlns:a="http://schemas.openxmlformats.org/drawingml/2006/main" xmlns:r="http://schemas.openxmlformats.org/officeDocument/2006/relationships" xmlns:p="http://schemas.openxmlformats.org/presentationml/2006/main">
+  <p:cSld>
+    <p:spTree>
+      <p:nvGrpSpPr>
+        <p:cNvPr id="1" name=""/>
+        <p:cNvGrpSpPr/>
+        <p:nvPr/>
+      </p:nvGrpSpPr>
+      <p:grpSpPr>
+        <a:xfrm>
+          <a:off x="0" y="0"/>
+          <a:ext cx="0" cy="0"/>
+          <a:chOff x="0" y="0"/>
+          <a:chExt cx="0" cy="0"/>
+        </a:xfrm>
+      </p:grpSpPr>
+      <p:sp>
+        <p:nvSpPr>
+          <p:cNvPr id="325" name="Shape 325"/>
+          <p:cNvSpPr>
+            <a:spLocks noGrp="1" noRot="1" noChangeAspect="1"/>
+          </p:cNvSpPr>
+          <p:nvPr>
+            <p:ph type="sldImg"/>
+          </p:nvPr>
+        </p:nvSpPr>
+        <p:spPr>
+          <a:prstGeom prst="rect">
+            <a:avLst/>
+          </a:prstGeom>
+        </p:spPr>
+        <p:txBody>
+          <a:bodyPr/>
+          <a:lstStyle/>
+          <a:p>
+            <a:endParaRPr/>
+          </a:p>
+        </p:txBody>
+      </p:sp>
+      <p:sp>
+        <p:nvSpPr>
+          <p:cNvPr id="326" name="Shape 326"/>
+          <p:cNvSpPr>
+            <a:spLocks noGrp="1"/>
+          </p:cNvSpPr>
+          <p:nvPr>
+            <p:ph type="body" sz="quarter" idx="1"/>
+          </p:nvPr>
+        </p:nvSpPr>
+        <p:spPr>
+          <a:prstGeom prst="rect">
+            <a:avLst/>
+          </a:prstGeom>
+        </p:spPr>
+        <p:txBody>
+          <a:bodyPr/>
+          <a:lstStyle/>
+          <a:p>
+            <a:r>
+              <a:rPr lang="zh-CN" altLang="en-US" dirty="0"/>
+              <a:t>和静态数组一样，动态数组也可以做</a:t>
+            </a:r>
+            <a:r>
+              <a:rPr lang="en-US" altLang="zh-CN" dirty="0"/>
+              <a:t>get</a:t>
+            </a:r>
+            <a:r>
+              <a:rPr lang="zh-CN" altLang="en-US" dirty="0"/>
+              <a:t>和</a:t>
+            </a:r>
+            <a:r>
+              <a:rPr lang="en-US" altLang="zh-CN" dirty="0"/>
+              <a:t>set</a:t>
+            </a:r>
+            <a:r>
+              <a:rPr lang="zh-CN" altLang="en-US" dirty="0"/>
+              <a:t>等操作，和静态数组不同的是，动态数组的大小可以按需扩大或者缩小。</a:t>
+            </a:r>
+            <a:endParaRPr lang="en-US" altLang="zh-CN" dirty="0"/>
+          </a:p>
+          <a:p>
+            <a:endParaRPr lang="en-US" dirty="0"/>
+          </a:p>
+          <a:p>
+            <a:r>
+              <a:rPr lang="zh-CN" altLang="en-US" dirty="0"/>
+              <a:t>比方说</a:t>
+            </a:r>
+            <a:r>
+              <a:rPr lang="en-US" altLang="zh-CN" dirty="0"/>
+              <a:t>PPT</a:t>
+            </a:r>
+            <a:r>
+              <a:rPr lang="zh-CN" altLang="en-US" dirty="0"/>
+              <a:t>上的例子，刚开始</a:t>
+            </a:r>
+            <a:r>
+              <a:rPr lang="en-US" altLang="zh-CN" dirty="0"/>
+              <a:t>A</a:t>
+            </a:r>
+            <a:r>
+              <a:rPr lang="zh-CN" altLang="en-US" dirty="0"/>
+              <a:t>数组有两个元素，它的大小是</a:t>
+            </a:r>
+            <a:r>
+              <a:rPr lang="en-US" altLang="zh-CN" dirty="0"/>
+              <a:t>2</a:t>
+            </a:r>
+            <a:r>
+              <a:rPr lang="zh-CN" altLang="en-US" dirty="0"/>
+              <a:t>，然后我们在后面添加一个</a:t>
+            </a:r>
+            <a:r>
+              <a:rPr lang="en-US" altLang="zh-CN" dirty="0"/>
+              <a:t>-7</a:t>
+            </a:r>
+            <a:r>
+              <a:rPr lang="zh-CN" altLang="en-US" dirty="0"/>
+              <a:t>，数组的大小就增大到</a:t>
+            </a:r>
+            <a:r>
+              <a:rPr lang="en-US" altLang="zh-CN" dirty="0"/>
+              <a:t>3</a:t>
+            </a:r>
+            <a:r>
+              <a:rPr lang="zh-CN" altLang="en-US" dirty="0"/>
+              <a:t>个，再添加一个</a:t>
+            </a:r>
+            <a:r>
+              <a:rPr lang="en-US" altLang="zh-CN" dirty="0"/>
+              <a:t>34</a:t>
+            </a:r>
+            <a:r>
+              <a:rPr lang="zh-CN" altLang="en-US" dirty="0"/>
+              <a:t>，大小就增大到</a:t>
+            </a:r>
+            <a:r>
+              <a:rPr lang="en-US" altLang="zh-CN" dirty="0"/>
+              <a:t>4</a:t>
+            </a:r>
+            <a:r>
+              <a:rPr lang="zh-CN" altLang="en-US" dirty="0"/>
+              <a:t>个。如果移除一个</a:t>
+            </a:r>
+            <a:r>
+              <a:rPr lang="en-US" altLang="zh-CN" dirty="0"/>
+              <a:t>4</a:t>
+            </a:r>
+            <a:r>
+              <a:rPr lang="zh-CN" altLang="en-US" dirty="0"/>
+              <a:t>，那么数组的大小又缩小到</a:t>
+            </a:r>
+            <a:r>
+              <a:rPr lang="en-US" altLang="zh-CN" dirty="0"/>
+              <a:t>3</a:t>
+            </a:r>
+            <a:r>
+              <a:rPr lang="zh-CN" altLang="en-US" dirty="0"/>
+              <a:t>个。这个应该很好理解吧。</a:t>
+            </a:r>
+            <a:endParaRPr lang="en-US" altLang="zh-CN" dirty="0"/>
+          </a:p>
+          <a:p>
+            <a:endParaRPr lang="en-US" dirty="0"/>
+          </a:p>
+          <a:p>
+            <a:endParaRPr dirty="0"/>
+          </a:p>
+        </p:txBody>
+      </p:sp>
+    </p:spTree>
+  </p:cSld>
+  <p:clrMapOvr>
+    <a:masterClrMapping/>
+  </p:clrMapOvr>
+</p:notes>
+</file>
+
+<file path=ppt/notesSlides/notesSlide14.xml><?xml version="1.0" encoding="utf-8"?>
+<p:notes xmlns:a="http://schemas.openxmlformats.org/drawingml/2006/main" xmlns:r="http://schemas.openxmlformats.org/officeDocument/2006/relationships" xmlns:p="http://schemas.openxmlformats.org/presentationml/2006/main">
+  <p:cSld>
+    <p:spTree>
+      <p:nvGrpSpPr>
+        <p:cNvPr id="1" name=""/>
+        <p:cNvGrpSpPr/>
+        <p:nvPr/>
+      </p:nvGrpSpPr>
+      <p:grpSpPr>
+        <a:xfrm>
+          <a:off x="0" y="0"/>
+          <a:ext cx="0" cy="0"/>
+          <a:chOff x="0" y="0"/>
+          <a:chExt cx="0" cy="0"/>
+        </a:xfrm>
+      </p:grpSpPr>
+      <p:sp>
+        <p:nvSpPr>
+          <p:cNvPr id="332" name="Shape 332"/>
+          <p:cNvSpPr>
+            <a:spLocks noGrp="1" noRot="1" noChangeAspect="1"/>
+          </p:cNvSpPr>
+          <p:nvPr>
+            <p:ph type="sldImg"/>
+          </p:nvPr>
+        </p:nvSpPr>
+        <p:spPr>
+          <a:prstGeom prst="rect">
+            <a:avLst/>
+          </a:prstGeom>
+        </p:spPr>
+        <p:txBody>
+          <a:bodyPr/>
+          <a:lstStyle/>
+          <a:p>
+            <a:endParaRPr/>
+          </a:p>
+        </p:txBody>
+      </p:sp>
+      <p:sp>
+        <p:nvSpPr>
+          <p:cNvPr id="333" name="Shape 333"/>
+          <p:cNvSpPr>
+            <a:spLocks noGrp="1"/>
+          </p:cNvSpPr>
+          <p:nvPr>
+            <p:ph type="body" sz="quarter" idx="1"/>
+          </p:nvPr>
+        </p:nvSpPr>
+        <p:spPr>
+          <a:prstGeom prst="rect">
+            <a:avLst/>
+          </a:prstGeom>
+        </p:spPr>
+        <p:txBody>
+          <a:bodyPr/>
+          <a:lstStyle/>
+          <a:p>
+            <a:r>
+              <a:rPr lang="zh-CN" altLang="en-US" dirty="0"/>
+              <a:t>那么动态数组该如何来实现呢？一种常见的做法是使用静态数组，当然这个不是唯一的办法。</a:t>
+            </a:r>
+            <a:endParaRPr lang="en-US" altLang="zh-CN" dirty="0"/>
+          </a:p>
+          <a:p>
+            <a:endParaRPr lang="en-US" dirty="0"/>
+          </a:p>
+          <a:p>
+            <a:r>
+              <a:rPr lang="zh-CN" altLang="en-US" dirty="0"/>
+              <a:t>下面是使用静态数组实现的伪代码：</a:t>
+            </a:r>
+            <a:endParaRPr lang="en-US" altLang="zh-CN" dirty="0"/>
+          </a:p>
+          <a:p>
+            <a:endParaRPr lang="en-US" dirty="0"/>
+          </a:p>
+          <a:p>
+            <a:pPr marL="457200" indent="-457200">
+              <a:buAutoNum type="arabicPeriod"/>
+            </a:pPr>
+            <a:r>
+              <a:rPr lang="zh-CN" altLang="en-US" dirty="0"/>
+              <a:t>首先先创建一个具有初始容量的静态数组，通常这个初始容量不为</a:t>
+            </a:r>
+            <a:r>
+              <a:rPr lang="en-US" altLang="zh-CN" dirty="0"/>
+              <a:t>0</a:t>
+            </a:r>
+            <a:r>
+              <a:rPr lang="zh-CN" altLang="en-US" dirty="0"/>
+              <a:t>。</a:t>
+            </a:r>
+            <a:endParaRPr lang="en-US" altLang="zh-CN" dirty="0"/>
+          </a:p>
+          <a:p>
+            <a:pPr marL="457200" indent="-457200">
+              <a:buAutoNum type="arabicPeriod"/>
+            </a:pPr>
+            <a:r>
+              <a:rPr lang="zh-CN" altLang="en-US" dirty="0"/>
+              <a:t>然后，我们可以按需向底层的静态数组中添加元素，并且跟踪元素的个数</a:t>
+            </a:r>
+            <a:endParaRPr lang="en-US" altLang="zh-CN" dirty="0"/>
+          </a:p>
+          <a:p>
+            <a:pPr marL="457200" indent="-457200">
+              <a:buAutoNum type="arabicPeriod"/>
+            </a:pPr>
+            <a:r>
+              <a:rPr lang="zh-CN" altLang="en-US" dirty="0"/>
+              <a:t>后续如果继续添加元素会超出静态数组的容量，那么就创建一个具有两倍容量的新数组，并将原数组的内容拷贝到新数组当中去。</a:t>
+            </a:r>
+            <a:endParaRPr lang="en-US" altLang="zh-CN" dirty="0"/>
+          </a:p>
+          <a:p>
+            <a:pPr marL="457200" indent="-457200">
+              <a:buAutoNum type="arabicPeriod"/>
+            </a:pPr>
+            <a:endParaRPr lang="en-US" altLang="zh-CN" dirty="0"/>
+          </a:p>
+          <a:p>
+            <a:pPr marL="457200" indent="-457200">
+              <a:buAutoNum type="arabicPeriod"/>
+            </a:pPr>
+            <a:endParaRPr lang="en-US" altLang="zh-CN" dirty="0"/>
+          </a:p>
+        </p:txBody>
+      </p:sp>
+    </p:spTree>
+  </p:cSld>
+  <p:clrMapOvr>
+    <a:masterClrMapping/>
+  </p:clrMapOvr>
+</p:notes>
+</file>
+
+<file path=ppt/notesSlides/notesSlide15.xml><?xml version="1.0" encoding="utf-8"?>
+<p:notes xmlns:a="http://schemas.openxmlformats.org/drawingml/2006/main" xmlns:r="http://schemas.openxmlformats.org/officeDocument/2006/relationships" xmlns:p="http://schemas.openxmlformats.org/presentationml/2006/main">
+  <p:cSld>
+    <p:spTree>
+      <p:nvGrpSpPr>
+        <p:cNvPr id="1" name=""/>
+        <p:cNvGrpSpPr/>
+        <p:nvPr/>
+      </p:nvGrpSpPr>
+      <p:grpSpPr>
+        <a:xfrm>
+          <a:off x="0" y="0"/>
+          <a:ext cx="0" cy="0"/>
+          <a:chOff x="0" y="0"/>
+          <a:chExt cx="0" cy="0"/>
+        </a:xfrm>
+      </p:grpSpPr>
+      <p:sp>
+        <p:nvSpPr>
+          <p:cNvPr id="344" name="Shape 344"/>
+          <p:cNvSpPr>
+            <a:spLocks noGrp="1" noRot="1" noChangeAspect="1"/>
+          </p:cNvSpPr>
+          <p:nvPr>
+            <p:ph type="sldImg"/>
+          </p:nvPr>
+        </p:nvSpPr>
+        <p:spPr>
+          <a:prstGeom prst="rect">
+            <a:avLst/>
+          </a:prstGeom>
+        </p:spPr>
+        <p:txBody>
+          <a:bodyPr/>
+          <a:lstStyle/>
+          <a:p>
+            <a:endParaRPr/>
+          </a:p>
+        </p:txBody>
+      </p:sp>
+      <p:sp>
+        <p:nvSpPr>
+          <p:cNvPr id="345" name="Shape 345"/>
+          <p:cNvSpPr>
+            <a:spLocks noGrp="1"/>
+          </p:cNvSpPr>
+          <p:nvPr>
+            <p:ph type="body" sz="quarter" idx="1"/>
+          </p:nvPr>
+        </p:nvSpPr>
+        <p:spPr>
+          <a:prstGeom prst="rect">
+            <a:avLst/>
+          </a:prstGeom>
+        </p:spPr>
+        <p:txBody>
+          <a:bodyPr/>
+          <a:lstStyle/>
+          <a:p>
+            <a:r>
+              <a:rPr lang="zh-CN" altLang="en-US" dirty="0"/>
+              <a:t>下面看一个动态数组的演示样例，</a:t>
+            </a:r>
+            <a:endParaRPr lang="en-US" altLang="zh-CN" dirty="0"/>
+          </a:p>
+          <a:p>
+            <a:endParaRPr lang="en-US" dirty="0"/>
+          </a:p>
+          <a:p>
+            <a:r>
+              <a:rPr lang="en-US" dirty="0"/>
+              <a:t>假定我们创建了一个初始容量为</a:t>
+            </a:r>
+            <a:r>
+              <a:rPr lang="en-US" altLang="zh-CN" dirty="0"/>
+              <a:t>2</a:t>
+            </a:r>
+            <a:r>
+              <a:rPr lang="zh-CN" altLang="en-US" dirty="0"/>
+              <a:t>的动态数组，这个时候两个元素位置都是空的，我们用一个圈</a:t>
+            </a:r>
+            <a:r>
+              <a:rPr lang="en-US" altLang="zh-CN" dirty="0"/>
+              <a:t>+</a:t>
+            </a:r>
+            <a:r>
+              <a:rPr lang="zh-CN" altLang="en-US" dirty="0"/>
+              <a:t>一个反斜杠表示，然后开始向其中添加元素。。。</a:t>
+            </a:r>
+            <a:endParaRPr lang="en-US" dirty="0"/>
+          </a:p>
+          <a:p>
+            <a:endParaRPr lang="en-US" dirty="0"/>
+          </a:p>
+          <a:p>
+            <a:r>
+              <a:rPr lang="en-US" dirty="0"/>
+              <a:t>先添加</a:t>
+            </a:r>
+            <a:r>
+              <a:rPr lang="en-US" altLang="zh-CN" dirty="0"/>
+              <a:t>7</a:t>
+            </a:r>
+            <a:r>
+              <a:rPr lang="zh-CN" altLang="en-US" dirty="0"/>
+              <a:t>，占据第一个位置。再添加</a:t>
+            </a:r>
+            <a:r>
+              <a:rPr lang="en-US" altLang="zh-CN" dirty="0"/>
+              <a:t>-9</a:t>
+            </a:r>
+            <a:r>
+              <a:rPr lang="zh-CN" altLang="en-US" dirty="0"/>
+              <a:t>，占据第二个位置。当我们要继续添加</a:t>
+            </a:r>
+            <a:r>
+              <a:rPr lang="en-US" altLang="zh-CN" dirty="0"/>
+              <a:t>3</a:t>
+            </a:r>
+            <a:r>
+              <a:rPr lang="zh-CN" altLang="en-US" dirty="0"/>
+              <a:t>的时候，静态数组的空间已经满了，所以我们再创建一个两倍大小，也就是</a:t>
+            </a:r>
+            <a:r>
+              <a:rPr lang="en-US" altLang="zh-CN" dirty="0"/>
+              <a:t>4</a:t>
+            </a:r>
+            <a:r>
+              <a:rPr lang="zh-CN" altLang="en-US" dirty="0"/>
+              <a:t>个元素的静态数组，先把</a:t>
+            </a:r>
+            <a:r>
+              <a:rPr lang="en-US" altLang="zh-CN" dirty="0"/>
+              <a:t>7</a:t>
+            </a:r>
+            <a:r>
+              <a:rPr lang="zh-CN" altLang="en-US" dirty="0"/>
+              <a:t>和</a:t>
+            </a:r>
+            <a:r>
+              <a:rPr lang="en-US" altLang="zh-CN" dirty="0"/>
+              <a:t>-9</a:t>
+            </a:r>
+            <a:r>
+              <a:rPr lang="zh-CN" altLang="en-US" dirty="0"/>
+              <a:t>拷贝进入，然后再把</a:t>
+            </a:r>
+            <a:r>
+              <a:rPr lang="en-US" altLang="zh-CN" dirty="0"/>
+              <a:t>3</a:t>
+            </a:r>
+            <a:r>
+              <a:rPr lang="zh-CN" altLang="en-US" dirty="0"/>
+              <a:t>添加到第三个位置。</a:t>
+            </a:r>
+            <a:endParaRPr lang="en-US" altLang="zh-CN" dirty="0"/>
+          </a:p>
+          <a:p>
+            <a:endParaRPr lang="en-US" dirty="0"/>
+          </a:p>
+          <a:p>
+            <a:r>
+              <a:rPr lang="zh-CN" altLang="en-US" dirty="0"/>
+              <a:t>然后再添加</a:t>
+            </a:r>
+            <a:r>
+              <a:rPr lang="en-US" altLang="zh-CN" dirty="0"/>
+              <a:t>12</a:t>
+            </a:r>
+            <a:r>
+              <a:rPr lang="zh-CN" altLang="en-US" dirty="0"/>
+              <a:t>到第四个位置。</a:t>
+            </a:r>
+            <a:endParaRPr lang="en-US" altLang="zh-CN" dirty="0"/>
+          </a:p>
+          <a:p>
+            <a:endParaRPr lang="en-US" dirty="0"/>
+          </a:p>
+          <a:p>
+            <a:r>
+              <a:rPr lang="zh-CN" altLang="en-US" dirty="0"/>
+              <a:t>同样，当我们要继续添加</a:t>
+            </a:r>
+            <a:r>
+              <a:rPr lang="en-US" altLang="zh-CN" dirty="0"/>
+              <a:t>5</a:t>
+            </a:r>
+            <a:r>
+              <a:rPr lang="zh-CN" altLang="en-US" dirty="0"/>
+              <a:t>的时候，元素位置已经占满，所以需要再创建一个大小为</a:t>
+            </a:r>
+            <a:r>
+              <a:rPr lang="en-US" altLang="zh-CN" dirty="0"/>
+              <a:t>8</a:t>
+            </a:r>
+            <a:r>
+              <a:rPr lang="zh-CN" altLang="en-US" dirty="0"/>
+              <a:t>的静态数组，把之前的</a:t>
+            </a:r>
+            <a:r>
+              <a:rPr lang="en-US" altLang="zh-CN" dirty="0"/>
+              <a:t>4</a:t>
+            </a:r>
+            <a:r>
+              <a:rPr lang="zh-CN" altLang="en-US" dirty="0"/>
+              <a:t>个元素先拷贝进去，再添加</a:t>
+            </a:r>
+            <a:r>
+              <a:rPr lang="en-US" altLang="zh-CN" dirty="0"/>
+              <a:t>5</a:t>
+            </a:r>
+            <a:r>
+              <a:rPr lang="zh-CN" altLang="en-US" dirty="0"/>
+              <a:t>，之后再添加</a:t>
+            </a:r>
+            <a:r>
+              <a:rPr lang="en-US" altLang="zh-CN" dirty="0"/>
+              <a:t>-6</a:t>
+            </a:r>
+            <a:r>
+              <a:rPr lang="zh-CN" altLang="en-US" dirty="0"/>
+              <a:t>。</a:t>
+            </a:r>
+            <a:endParaRPr lang="en-US" altLang="zh-CN" dirty="0"/>
+          </a:p>
+          <a:p>
+            <a:endParaRPr lang="en-US" dirty="0"/>
+          </a:p>
+          <a:p>
+            <a:r>
+              <a:rPr lang="zh-CN" altLang="en-US" dirty="0"/>
+              <a:t>在这个例子中，我们每次将静态数组的大小扩大一倍，但是其实也可以每次扩大到原来的</a:t>
+            </a:r>
+            <a:r>
+              <a:rPr lang="en-US" altLang="zh-CN" dirty="0"/>
+              <a:t>1.5</a:t>
+            </a:r>
+            <a:r>
+              <a:rPr lang="zh-CN" altLang="en-US" dirty="0"/>
+              <a:t>倍，或者</a:t>
+            </a:r>
+            <a:r>
+              <a:rPr lang="en-US" altLang="zh-CN" dirty="0"/>
+              <a:t>3</a:t>
+            </a:r>
+            <a:r>
+              <a:rPr lang="zh-CN" altLang="en-US" dirty="0"/>
+              <a:t>倍，甚至</a:t>
+            </a:r>
+            <a:r>
+              <a:rPr lang="en-US" altLang="zh-CN" dirty="0"/>
+              <a:t>10</a:t>
+            </a:r>
+            <a:r>
+              <a:rPr lang="zh-CN" altLang="en-US" dirty="0"/>
+              <a:t>倍。但是要注意，如果扩大的空间太大，容易造成内存空间浪费，因为有可能这些扩大的空元素位置一直用不到，结果白白占据了内存空间。</a:t>
+            </a:r>
+            <a:endParaRPr lang="en-US" dirty="0"/>
           </a:p>
         </p:txBody>
       </p:sp>
@@ -652,8 +1472,50 @@
           <a:lstStyle/>
           <a:p>
             <a:r>
-              <a:t>First we’re going to begin by having a discussion about arrays and answer some of the fundamental questions such as what, where and how are arrays used. Next I will explain the basic structure of the array and common operations we can do with them including how dynamic arrays work. Lastly we will go over some complexity analysis and look at some source code on how to construct a dynamic array using a static array.</a:t>
-            </a:r>
+              <a:rPr lang="en-US" dirty="0" err="1"/>
+              <a:t>下面我们来看下本课的大纲</a:t>
+            </a:r>
+            <a:r>
+              <a:rPr lang="zh-CN" altLang="en-US" dirty="0"/>
+              <a:t>。</a:t>
+            </a:r>
+            <a:endParaRPr lang="en-US" altLang="zh-CN" dirty="0"/>
+          </a:p>
+          <a:p>
+            <a:endParaRPr lang="en-US" dirty="0"/>
+          </a:p>
+          <a:p>
+            <a:r>
+              <a:rPr lang="zh-CN" altLang="en-US" dirty="0"/>
+              <a:t>首先我会介绍什么是数组，包括数组的使用场景。</a:t>
+            </a:r>
+            <a:endParaRPr lang="en-US" altLang="zh-CN" dirty="0"/>
+          </a:p>
+          <a:p>
+            <a:endParaRPr lang="en-US" altLang="zh-CN" dirty="0"/>
+          </a:p>
+          <a:p>
+            <a:r>
+              <a:rPr lang="zh-CN" altLang="en-US" dirty="0"/>
+              <a:t>然后我会说明数组支持的主要操作，分析它们的复杂度，然后我会演示静态数组的一些使用样例。</a:t>
+            </a:r>
+            <a:endParaRPr lang="en-US" altLang="zh-CN" dirty="0"/>
+          </a:p>
+          <a:p>
+            <a:endParaRPr lang="en-US" altLang="zh-CN" dirty="0"/>
+          </a:p>
+          <a:p>
+            <a:r>
+              <a:rPr lang="zh-CN" altLang="en-US" dirty="0"/>
+              <a:t>最后，我演示动态数组是如何工作的，然后通过代码，演示如何基于静态数组来实现动态数组。</a:t>
+            </a:r>
+            <a:endParaRPr lang="en-US" altLang="zh-CN" dirty="0"/>
+          </a:p>
+          <a:p>
+            <a:endParaRPr lang="en-US" dirty="0"/>
+          </a:p>
+          <a:p>
+            <a:endParaRPr lang="en-US" dirty="0"/>
           </a:p>
         </p:txBody>
       </p:sp>
@@ -684,7 +1546,7 @@
       </p:grpSpPr>
       <p:sp>
         <p:nvSpPr>
-          <p:cNvPr id="134" name="Shape 134"/>
+          <p:cNvPr id="2" name="幻灯片图像占位符 1"/>
           <p:cNvSpPr>
             <a:spLocks noGrp="1" noRot="1" noChangeAspect="1"/>
           </p:cNvSpPr>
@@ -692,53 +1554,36 @@
             <p:ph type="sldImg"/>
           </p:nvPr>
         </p:nvSpPr>
-        <p:spPr>
-          <a:prstGeom prst="rect">
-            <a:avLst/>
-          </a:prstGeom>
-        </p:spPr>
-        <p:txBody>
-          <a:bodyPr/>
-          <a:lstStyle/>
-          <a:p>
-            <a:endParaRPr/>
-          </a:p>
-        </p:txBody>
-      </p:sp>
-      <p:sp>
-        <p:nvSpPr>
-          <p:cNvPr id="135" name="Shape 135"/>
+        <p:spPr/>
+      </p:sp>
+      <p:sp>
+        <p:nvSpPr>
+          <p:cNvPr id="3" name="备注占位符 2"/>
           <p:cNvSpPr>
             <a:spLocks noGrp="1"/>
           </p:cNvSpPr>
           <p:nvPr>
-            <p:ph type="body" sz="quarter" idx="1"/>
+            <p:ph type="body" idx="1"/>
           </p:nvPr>
         </p:nvSpPr>
-        <p:spPr>
-          <a:prstGeom prst="rect">
-            <a:avLst/>
-          </a:prstGeom>
-        </p:spPr>
+        <p:spPr/>
         <p:txBody>
           <a:bodyPr/>
           <a:lstStyle/>
           <a:p>
             <a:r>
-              <a:t>Read slide.</a:t>
-            </a:r>
-          </a:p>
-          <a:p>
-            <a:endParaRPr/>
-          </a:p>
-          <a:p>
-            <a:r>
-              <a:t>Furthermore I would like to add that a static array is given as a contiguous chunk of memory meaning that the chunk of memory you got doesn’t look like a piece of swiss cheese with a bunch of holes and gaps.</a:t>
+              <a:rPr kumimoji="1" lang="zh-CN" altLang="en-US" dirty="0"/>
+              <a:t>下面我们来介绍数组，再看一些样例。</a:t>
             </a:r>
           </a:p>
         </p:txBody>
       </p:sp>
     </p:spTree>
+    <p:extLst>
+      <p:ext uri="{BB962C8B-B14F-4D97-AF65-F5344CB8AC3E}">
+        <p14:creationId xmlns:p14="http://schemas.microsoft.com/office/powerpoint/2010/main" val="2956048371"/>
+      </p:ext>
+    </p:extLst>
   </p:cSld>
   <p:clrMapOvr>
     <a:masterClrMapping/>
@@ -765,7 +1610,7 @@
       </p:grpSpPr>
       <p:sp>
         <p:nvSpPr>
-          <p:cNvPr id="139" name="Shape 139"/>
+          <p:cNvPr id="134" name="Shape 134"/>
           <p:cNvSpPr>
             <a:spLocks noGrp="1" noRot="1" noChangeAspect="1"/>
           </p:cNvSpPr>
@@ -788,7 +1633,7 @@
       </p:sp>
       <p:sp>
         <p:nvSpPr>
-          <p:cNvPr id="140" name="Shape 140"/>
+          <p:cNvPr id="135" name="Shape 135"/>
           <p:cNvSpPr>
             <a:spLocks noGrp="1"/>
           </p:cNvSpPr>
@@ -806,48 +1651,50 @@
           <a:lstStyle/>
           <a:p>
             <a:r>
-              <a:t>Arrays are used everywhere, absolutely everywhere it’s hard to make a program that doesn’t use them. Here are a few places arrays get used you may or may not have known.</a:t>
-            </a:r>
-          </a:p>
-          <a:p>
-            <a:endParaRPr/>
-          </a:p>
-          <a:p>
-            <a:r>
-              <a:t>First is to temporarily store objects this is the most common thing we do with arrays</a:t>
-            </a:r>
-          </a:p>
-          <a:p>
-            <a:endParaRPr/>
-          </a:p>
-          <a:p>
-            <a:r>
-              <a:t>Next is when we use arrays as buffers to store information from an input or an output stream. Suppose you have a really large file you need to process, but it cannot all fit in memory then you can use a buffer to read small chunks of the file one at a time.</a:t>
-            </a:r>
-          </a:p>
-          <a:p>
-            <a:endParaRPr/>
-          </a:p>
-          <a:p>
-            <a:r>
-              <a:t>Arrays are also great as lookup tables because of their indexing property. This way it is easy to retrieve data from a lookup table if you know where everything it supposed to be and at what offset.</a:t>
-            </a:r>
-          </a:p>
-          <a:p>
-            <a:endParaRPr/>
-          </a:p>
-          <a:p>
-            <a:r>
-              <a:t>Next, we can also use arrays as a workaround in a programming language that only allows one return value to return multiple values via a pointer or reference to an array.</a:t>
-            </a:r>
-          </a:p>
-          <a:p>
-            <a:endParaRPr/>
-          </a:p>
-          <a:p>
-            <a:r>
-              <a:t>This last example is a bit more advanced but arrays are heavily used in a programming technique called dynamic programming with tabulation to cache already computed subproblems. A classic example is the knapsack problem or the coin change problem.</a:t>
-            </a:r>
+              <a:rPr lang="en-US" dirty="0" err="1"/>
+              <a:t>那么什么是静态数组呢</a:t>
+            </a:r>
+            <a:r>
+              <a:rPr lang="zh-CN" altLang="en-US" dirty="0"/>
+              <a:t>？</a:t>
+            </a:r>
+            <a:endParaRPr lang="en-US" altLang="zh-CN" dirty="0"/>
+          </a:p>
+          <a:p>
+            <a:endParaRPr lang="en-US" dirty="0"/>
+          </a:p>
+          <a:p>
+            <a:r>
+              <a:rPr lang="zh-CN" altLang="en-US" dirty="0"/>
+              <a:t>所谓静态数组，它是一个包含</a:t>
+            </a:r>
+            <a:r>
+              <a:rPr lang="en-US" altLang="zh-CN" dirty="0"/>
+              <a:t>n</a:t>
+            </a:r>
+            <a:r>
+              <a:rPr lang="zh-CN" altLang="en-US" dirty="0"/>
+              <a:t>个元素的定长的容器，其中的元素是可以索引的，范围从</a:t>
+            </a:r>
+            <a:r>
+              <a:rPr lang="en-US" altLang="zh-CN" dirty="0"/>
+              <a:t>[0, n-1]</a:t>
+            </a:r>
+            <a:r>
+              <a:rPr lang="zh-CN" altLang="en-US" dirty="0"/>
+              <a:t>。你可能会问，什么叫可索引？其实可索引的意思是说，数组中的每一个槽位，都是可以通过一个唯一数字进行引用的。</a:t>
+            </a:r>
+            <a:endParaRPr dirty="0"/>
+          </a:p>
+          <a:p>
+            <a:endParaRPr lang="en-US" dirty="0"/>
+          </a:p>
+          <a:p>
+            <a:r>
+              <a:rPr lang="zh-CN" altLang="en-US" dirty="0"/>
+              <a:t>需要进一步说明的是，静态数组的底层实现，是采用连续的内存地址块来实现的，而不是像瑞士芝士那样有空洞和间隙。</a:t>
+            </a:r>
+            <a:endParaRPr lang="en-US" altLang="zh-CN" dirty="0"/>
           </a:p>
         </p:txBody>
       </p:sp>
@@ -878,7 +1725,7 @@
       </p:grpSpPr>
       <p:sp>
         <p:nvSpPr>
-          <p:cNvPr id="146" name="Shape 146"/>
+          <p:cNvPr id="139" name="Shape 139"/>
           <p:cNvSpPr>
             <a:spLocks noGrp="1" noRot="1" noChangeAspect="1"/>
           </p:cNvSpPr>
@@ -901,7 +1748,7 @@
       </p:sp>
       <p:sp>
         <p:nvSpPr>
-          <p:cNvPr id="147" name="Shape 147"/>
+          <p:cNvPr id="140" name="Shape 140"/>
           <p:cNvSpPr>
             <a:spLocks noGrp="1"/>
           </p:cNvSpPr>
@@ -919,45 +1766,92 @@
           <a:lstStyle/>
           <a:p>
             <a:r>
-              <a:t>Access time is constant for both the static and the dynamic array since arrays are indexable. </a:t>
-            </a:r>
-          </a:p>
-          <a:p>
-            <a:r>
-              <a:t>Searching takes linear time because we have to traverse all the elements in the worse case.</a:t>
-            </a:r>
-          </a:p>
-          <a:p>
-            <a:endParaRPr/>
-          </a:p>
-          <a:p>
-            <a:r>
-              <a:t>Inserting, Appending and deletion for static arrays does not make sense, you cannot make a static array larger or smaller.</a:t>
-            </a:r>
-          </a:p>
-          <a:p>
-            <a:endParaRPr/>
-          </a:p>
-          <a:p>
-            <a:r>
-              <a:t>When Inserting with a dynamic array this operation is linear since potentially all elements will need to be shifted to the right if the element is being inserted at the beginning. I am assuming here that we are implementing a dynamic array using static arrays.</a:t>
-            </a:r>
-          </a:p>
-          <a:p>
-            <a:endParaRPr/>
-          </a:p>
-          <a:p>
-            <a:r>
-              <a:t>Appending however, is constant time how strange no? When appending, we sometimes need to resize the internal static array, but this happens so rarely that appending becomes amortized constant time.</a:t>
-            </a:r>
-          </a:p>
-          <a:p>
-            <a:endParaRPr/>
-          </a:p>
-          <a:p>
-            <a:r>
-              <a:t>Deletions are linear for the same reason that insertions are linear (you must shift elements over).</a:t>
-            </a:r>
+              <a:rPr lang="en-US" dirty="0" err="1"/>
+              <a:t>下面来看一下静态数组的使用场景</a:t>
+            </a:r>
+            <a:r>
+              <a:rPr lang="zh-CN" altLang="en-US" dirty="0"/>
+              <a:t>，静态数组的应用非常广泛，几乎每一个程序都可以看到它们的影子。下面是一些常见的例子。</a:t>
+            </a:r>
+            <a:endParaRPr lang="en-US" dirty="0"/>
+          </a:p>
+          <a:p>
+            <a:endParaRPr lang="en-US" dirty="0"/>
+          </a:p>
+          <a:p>
+            <a:r>
+              <a:rPr lang="zh-CN" altLang="en-US" dirty="0"/>
+              <a:t>当然，首先数组可以用于存储和访问顺序数据，还可以存储临时对象，这些你可能已经实际用过了。</a:t>
+            </a:r>
+            <a:endParaRPr lang="en-US" dirty="0"/>
+          </a:p>
+          <a:p>
+            <a:endParaRPr lang="en-US" dirty="0"/>
+          </a:p>
+          <a:p>
+            <a:r>
+              <a:rPr lang="en-US" dirty="0" err="1"/>
+              <a:t>其次</a:t>
+            </a:r>
+            <a:r>
+              <a:rPr lang="zh-CN" altLang="en-US" dirty="0"/>
+              <a:t>，数组也可以用作输入</a:t>
+            </a:r>
+            <a:r>
+              <a:rPr lang="en-US" altLang="zh-CN" dirty="0"/>
+              <a:t>/</a:t>
+            </a:r>
+            <a:r>
+              <a:rPr lang="zh-CN" altLang="en-US" dirty="0"/>
+              <a:t>输出流的缓冲区。假设我们需要处理一个非常大的文件，这个文件太大以至于无法一下子装入内存，于是我们可以利用数组作为缓冲</a:t>
+            </a:r>
+            <a:r>
+              <a:rPr lang="en-US" altLang="zh-CN" dirty="0"/>
+              <a:t>buffer</a:t>
+            </a:r>
+            <a:r>
+              <a:rPr lang="zh-CN" altLang="en-US" dirty="0"/>
+              <a:t>，每次将文件的一部分读入缓冲，进行处理，直到全部文件处理完毕。</a:t>
+            </a:r>
+            <a:endParaRPr lang="en-US" dirty="0"/>
+          </a:p>
+          <a:p>
+            <a:endParaRPr lang="en-US" dirty="0"/>
+          </a:p>
+          <a:p>
+            <a:r>
+              <a:rPr lang="zh-CN" altLang="en-US" dirty="0"/>
+              <a:t>第三个，数组也可以用作查找表，因为它们具有索引属性。只需要知道数据在查找表中的索引或者偏移量，你就可以很容易从查找表找找到对应的数据。</a:t>
+            </a:r>
+            <a:endParaRPr dirty="0"/>
+          </a:p>
+          <a:p>
+            <a:endParaRPr lang="en-US" dirty="0"/>
+          </a:p>
+          <a:p>
+            <a:r>
+              <a:rPr lang="zh-CN" altLang="en-US" dirty="0"/>
+              <a:t>第四个，如果某种语言的函数只允许返回一个返回值，那么利用数组作为中介，通过返回数组的引用或者指针，你就可以同时返回多个返回值。</a:t>
+            </a:r>
+            <a:endParaRPr dirty="0"/>
+          </a:p>
+          <a:p>
+            <a:endParaRPr lang="en-US" dirty="0"/>
+          </a:p>
+          <a:p>
+            <a:r>
+              <a:rPr lang="zh-CN" altLang="en-US" dirty="0"/>
+              <a:t>最后一个例子稍微高级一点，数组在动态规划</a:t>
+            </a:r>
+            <a:r>
+              <a:rPr lang="en-US" altLang="zh-CN" dirty="0"/>
+              <a:t>(dynamic programming)</a:t>
+            </a:r>
+            <a:r>
+              <a:rPr lang="zh-CN" altLang="en-US" dirty="0"/>
+              <a:t>这种高级的编程技术中，也经常被使用。它们主要用于缓存子问题的计算结果。经典的例子是背包问题，还有零钱兑换问题。</a:t>
+            </a:r>
+            <a:endParaRPr dirty="0"/>
           </a:p>
         </p:txBody>
       </p:sp>
@@ -988,7 +1882,7 @@
       </p:grpSpPr>
       <p:sp>
         <p:nvSpPr>
-          <p:cNvPr id="172" name="Shape 172"/>
+          <p:cNvPr id="146" name="Shape 146"/>
           <p:cNvSpPr>
             <a:spLocks noGrp="1" noRot="1" noChangeAspect="1"/>
           </p:cNvSpPr>
@@ -1011,7 +1905,7 @@
       </p:sp>
       <p:sp>
         <p:nvSpPr>
-          <p:cNvPr id="173" name="Shape 173"/>
+          <p:cNvPr id="147" name="Shape 147"/>
           <p:cNvSpPr>
             <a:spLocks noGrp="1"/>
           </p:cNvSpPr>
@@ -1029,8 +1923,130 @@
           <a:lstStyle/>
           <a:p>
             <a:r>
-              <a:t>Now if we look at A you can see that it contains the values 44,12,-5,17,6,0,3,9,100. Currently all the elements are district but this is not a requirement of an array. Also remark that the very first element 44 has index or position 0 in the array, not 1 this confuses so many intro computer science students you have no idea. The confusing part is that most if not all of mathematics is 1 based while computer science is 0 based and this causes a lot of confusion. But the worst of all is quantum computing. I did research one summer in Quantum computing during by undergrad and the field is an absolute mess. It tries to please mathematicians, computer scientists and physicists all at the same time and it just does not work well… Anyways back to arrays, I’ll save the quantum computing for later. I should also note that elements can be iterated over using a for each loop, which does not require you to explicitly reference indices, although the indexing is being done internally.</a:t>
-            </a:r>
+              <a:rPr lang="en-US" dirty="0" err="1"/>
+              <a:t>下面我们提前来看一下静态和动态数组所支持的主要操作</a:t>
+            </a:r>
+            <a:r>
+              <a:rPr lang="zh-CN" altLang="en-US" dirty="0"/>
+              <a:t>，并分析它们</a:t>
+            </a:r>
+            <a:r>
+              <a:rPr lang="en-US" dirty="0" err="1"/>
+              <a:t>的复杂度</a:t>
+            </a:r>
+            <a:r>
+              <a:rPr lang="zh-CN" altLang="en-US" dirty="0"/>
+              <a:t>。</a:t>
+            </a:r>
+            <a:endParaRPr lang="en-US" dirty="0"/>
+          </a:p>
+          <a:p>
+            <a:endParaRPr lang="en-US" dirty="0"/>
+          </a:p>
+          <a:p>
+            <a:r>
+              <a:rPr lang="en-US" dirty="0" err="1"/>
+              <a:t>对于访问时间</a:t>
+            </a:r>
+            <a:r>
+              <a:rPr lang="zh-CN" altLang="en-US" dirty="0"/>
+              <a:t>，也就是通过索引定位元素，两个都是常量级</a:t>
+            </a:r>
+            <a:r>
+              <a:rPr lang="en-US" altLang="zh-CN" dirty="0"/>
+              <a:t>O(1)</a:t>
+            </a:r>
+            <a:r>
+              <a:rPr lang="zh-CN" altLang="en-US" dirty="0"/>
+              <a:t>的。</a:t>
+            </a:r>
+            <a:endParaRPr lang="en-US" dirty="0"/>
+          </a:p>
+          <a:p>
+            <a:endParaRPr dirty="0"/>
+          </a:p>
+          <a:p>
+            <a:r>
+              <a:rPr lang="en-US" dirty="0" err="1"/>
+              <a:t>对于查找</a:t>
+            </a:r>
+            <a:r>
+              <a:rPr lang="zh-CN" altLang="en-US" dirty="0"/>
+              <a:t>，如果不采用其它算法，直接用顺序查找，那么两个的复杂度都是</a:t>
+            </a:r>
+            <a:r>
+              <a:rPr lang="en-US" altLang="zh-CN" dirty="0"/>
+              <a:t>O(n)</a:t>
+            </a:r>
+            <a:r>
+              <a:rPr lang="zh-CN" altLang="en-US" dirty="0"/>
+              <a:t>，因为在最坏的情况下，我们必须顺序查找所有元素。</a:t>
+            </a:r>
+            <a:endParaRPr lang="en-US" dirty="0"/>
+          </a:p>
+          <a:p>
+            <a:endParaRPr lang="en-US" dirty="0"/>
+          </a:p>
+          <a:p>
+            <a:r>
+              <a:rPr lang="zh-CN" altLang="en-US" dirty="0"/>
+              <a:t>对于静态数组来说，插入</a:t>
+            </a:r>
+            <a:r>
+              <a:rPr lang="en-US" altLang="zh-CN" dirty="0"/>
+              <a:t>/</a:t>
+            </a:r>
+            <a:r>
+              <a:rPr lang="zh-CN" altLang="en-US" dirty="0"/>
+              <a:t>添加和删除都没有意义，因为静态数组是固定的，不能变大或变小。</a:t>
+            </a:r>
+            <a:endParaRPr dirty="0"/>
+          </a:p>
+          <a:p>
+            <a:endParaRPr dirty="0"/>
+          </a:p>
+          <a:p>
+            <a:r>
+              <a:rPr lang="en-US" dirty="0" err="1"/>
+              <a:t>对于动态数组的插入Insert</a:t>
+            </a:r>
+            <a:r>
+              <a:rPr lang="zh-CN" altLang="en-US" dirty="0"/>
+              <a:t>，它的复杂度是线性的，因为在最坏情况下，插入发生在第一个元素的位置，这时候，所有的元素都需要右移一个位置。我们这里假定动态数组是基于静态数组实现的。</a:t>
+            </a:r>
+            <a:endParaRPr lang="en-US" dirty="0"/>
+          </a:p>
+          <a:p>
+            <a:endParaRPr lang="en-US" dirty="0"/>
+          </a:p>
+          <a:p>
+            <a:r>
+              <a:rPr lang="zh-CN" altLang="en-US" dirty="0"/>
+              <a:t>对于动态数组的添加</a:t>
+            </a:r>
+            <a:r>
+              <a:rPr lang="en-US" altLang="zh-CN" dirty="0"/>
+              <a:t>Append</a:t>
+            </a:r>
+            <a:r>
+              <a:rPr lang="zh-CN" altLang="en-US" dirty="0"/>
+              <a:t>，它是常量级的。你可能会有疑问，因为有的时候当你添加元素的时候，内部的静态数组容量不够了，你需要重新分配一个更大容量的静态数组。这种情况确实存在，但是它发生的情况只是少数，最后平摊下来的结果，复杂度还是常量级的。</a:t>
+            </a:r>
+            <a:endParaRPr dirty="0"/>
+          </a:p>
+          <a:p>
+            <a:endParaRPr lang="en-US" dirty="0"/>
+          </a:p>
+          <a:p>
+            <a:r>
+              <a:rPr lang="en-US" dirty="0" err="1"/>
+              <a:t>最后</a:t>
+            </a:r>
+            <a:r>
+              <a:rPr lang="zh-CN" altLang="en-US" dirty="0"/>
+              <a:t>，和插入一样，对动态数组的删除也是线性级的，最坏的情况下，删除发生在第一个位置，这个时候所有剩下元素需要左移一个位置。</a:t>
+            </a:r>
+            <a:endParaRPr lang="en-US" dirty="0"/>
           </a:p>
         </p:txBody>
       </p:sp>
@@ -1061,7 +2077,7 @@
       </p:grpSpPr>
       <p:sp>
         <p:nvSpPr>
-          <p:cNvPr id="325" name="Shape 325"/>
+          <p:cNvPr id="172" name="Shape 172"/>
           <p:cNvSpPr>
             <a:spLocks noGrp="1" noRot="1" noChangeAspect="1"/>
           </p:cNvSpPr>
@@ -1084,7 +2100,7 @@
       </p:sp>
       <p:sp>
         <p:nvSpPr>
-          <p:cNvPr id="326" name="Shape 326"/>
+          <p:cNvPr id="173" name="Shape 173"/>
           <p:cNvSpPr>
             <a:spLocks noGrp="1"/>
           </p:cNvSpPr>
@@ -1102,8 +2118,166 @@
           <a:lstStyle/>
           <a:p>
             <a:r>
-              <a:t>The dynamic array can do all the similar get and set operations a static array can do, but unlike the static array the dynamic array can grow and shrink in size. </a:t>
-            </a:r>
+              <a:rPr lang="en-US" dirty="0" err="1"/>
+              <a:t>下面来看一个静态数组的样例</a:t>
+            </a:r>
+            <a:r>
+              <a:rPr lang="zh-CN" altLang="en-US" dirty="0"/>
+              <a:t>，这个数组包含</a:t>
+            </a:r>
+            <a:r>
+              <a:rPr lang="en-US" altLang="zh-CN" dirty="0"/>
+              <a:t>44</a:t>
+            </a:r>
+            <a:r>
+              <a:rPr lang="zh-CN" altLang="en-US" dirty="0"/>
+              <a:t>，</a:t>
+            </a:r>
+            <a:r>
+              <a:rPr lang="en-US" altLang="zh-CN" dirty="0"/>
+              <a:t>12</a:t>
+            </a:r>
+            <a:r>
+              <a:rPr lang="zh-CN" altLang="en-US" dirty="0"/>
+              <a:t>，</a:t>
+            </a:r>
+            <a:r>
+              <a:rPr lang="en-US" altLang="zh-CN" dirty="0"/>
+              <a:t>-5</a:t>
+            </a:r>
+            <a:r>
+              <a:rPr lang="zh-CN" altLang="en-US" dirty="0"/>
+              <a:t>，</a:t>
+            </a:r>
+            <a:r>
+              <a:rPr lang="en-US" altLang="zh-CN" dirty="0"/>
+              <a:t>17</a:t>
+            </a:r>
+            <a:r>
+              <a:rPr lang="zh-CN" altLang="en-US" dirty="0"/>
+              <a:t>，</a:t>
+            </a:r>
+            <a:r>
+              <a:rPr lang="en-US" altLang="zh-CN" dirty="0"/>
+              <a:t>6</a:t>
+            </a:r>
+            <a:r>
+              <a:rPr lang="zh-CN" altLang="en-US" dirty="0"/>
+              <a:t>，</a:t>
+            </a:r>
+            <a:r>
+              <a:rPr lang="en-US" altLang="zh-CN" dirty="0"/>
+              <a:t>0</a:t>
+            </a:r>
+            <a:r>
+              <a:rPr lang="zh-CN" altLang="en-US" dirty="0"/>
+              <a:t>，</a:t>
+            </a:r>
+            <a:r>
+              <a:rPr lang="en-US" altLang="zh-CN" dirty="0"/>
+              <a:t>3</a:t>
+            </a:r>
+            <a:r>
+              <a:rPr lang="zh-CN" altLang="en-US" dirty="0"/>
+              <a:t>，</a:t>
+            </a:r>
+            <a:r>
+              <a:rPr lang="en-US" altLang="zh-CN" dirty="0"/>
+              <a:t>9</a:t>
+            </a:r>
+            <a:r>
+              <a:rPr lang="zh-CN" altLang="en-US" dirty="0"/>
+              <a:t>和</a:t>
+            </a:r>
+            <a:r>
+              <a:rPr lang="en-US" altLang="zh-CN" dirty="0"/>
+              <a:t>100</a:t>
+            </a:r>
+            <a:r>
+              <a:rPr lang="zh-CN" altLang="en-US" dirty="0"/>
+              <a:t>共</a:t>
+            </a:r>
+            <a:r>
+              <a:rPr lang="en-US" altLang="zh-CN" dirty="0"/>
+              <a:t>9</a:t>
+            </a:r>
+            <a:r>
+              <a:rPr lang="zh-CN" altLang="en-US" dirty="0"/>
+              <a:t>个元素。虽然这个数组的元素都是各不相同的，但是数组并没有要求元素不同。注意，第一个元素</a:t>
+            </a:r>
+            <a:r>
+              <a:rPr lang="en-US" altLang="zh-CN" dirty="0"/>
+              <a:t>44</a:t>
+            </a:r>
+            <a:r>
+              <a:rPr lang="zh-CN" altLang="en-US" dirty="0"/>
+              <a:t>的索引是</a:t>
+            </a:r>
+            <a:r>
+              <a:rPr lang="en-US" altLang="zh-CN" dirty="0"/>
+              <a:t>0</a:t>
+            </a:r>
+            <a:r>
+              <a:rPr lang="zh-CN" altLang="en-US" dirty="0"/>
+              <a:t>，而不是</a:t>
+            </a:r>
+            <a:r>
+              <a:rPr lang="en-US" altLang="zh-CN" dirty="0"/>
+              <a:t>1</a:t>
+            </a:r>
+            <a:r>
+              <a:rPr lang="zh-CN" altLang="en-US" dirty="0"/>
+              <a:t>。对于刚学计算机编程的同学来说，这个是最让人困惑的地方，因为通常算术都是从</a:t>
+            </a:r>
+            <a:r>
+              <a:rPr lang="en-US" altLang="zh-CN" dirty="0"/>
+              <a:t>1</a:t>
+            </a:r>
+            <a:r>
+              <a:rPr lang="zh-CN" altLang="en-US" dirty="0"/>
+              <a:t>开始的，但是在计算机编程语言中却是从</a:t>
+            </a:r>
+            <a:r>
+              <a:rPr lang="en-US" altLang="zh-CN" dirty="0"/>
+              <a:t>0</a:t>
+            </a:r>
+            <a:r>
+              <a:rPr lang="zh-CN" altLang="en-US" dirty="0"/>
+              <a:t>开始的。这个问题是由计算机科学家造成，已经变成约定俗成的事情，大家习惯就好了。</a:t>
+            </a:r>
+            <a:endParaRPr lang="en-US" altLang="zh-CN" dirty="0"/>
+          </a:p>
+          <a:p>
+            <a:endParaRPr lang="en-US" dirty="0"/>
+          </a:p>
+          <a:p>
+            <a:r>
+              <a:rPr lang="zh-CN" altLang="en-US" dirty="0"/>
+              <a:t>另外在很多编程语言中，都支持使用</a:t>
+            </a:r>
+            <a:r>
+              <a:rPr lang="en-US" altLang="zh-CN" dirty="0"/>
+              <a:t>for each</a:t>
+            </a:r>
+            <a:r>
+              <a:rPr lang="zh-CN" altLang="en-US" dirty="0"/>
+              <a:t>循环对数组进行迭代，这时候，语句中不需要引用下标，当然实际底层还是会使用下标的，</a:t>
+            </a:r>
+            <a:r>
+              <a:rPr lang="en-US" altLang="zh-CN" dirty="0"/>
+              <a:t>for each</a:t>
+            </a:r>
+            <a:r>
+              <a:rPr lang="zh-CN" altLang="en-US" dirty="0"/>
+              <a:t>只是简化了语法。</a:t>
+            </a:r>
+            <a:endParaRPr lang="en-US" altLang="zh-CN" dirty="0"/>
+          </a:p>
+          <a:p>
+            <a:endParaRPr lang="en-US" dirty="0"/>
+          </a:p>
+          <a:p>
+            <a:endParaRPr dirty="0"/>
           </a:p>
         </p:txBody>
       </p:sp>
@@ -1134,7 +2308,7 @@
       </p:grpSpPr>
       <p:sp>
         <p:nvSpPr>
-          <p:cNvPr id="332" name="Shape 332"/>
+          <p:cNvPr id="2" name="幻灯片图像占位符 1"/>
           <p:cNvSpPr>
             <a:spLocks noGrp="1" noRot="1" noChangeAspect="1"/>
           </p:cNvSpPr>
@@ -1142,45 +2316,146 @@
             <p:ph type="sldImg"/>
           </p:nvPr>
         </p:nvSpPr>
-        <p:spPr>
-          <a:prstGeom prst="rect">
-            <a:avLst/>
-          </a:prstGeom>
-        </p:spPr>
-        <p:txBody>
-          <a:bodyPr/>
-          <a:lstStyle/>
-          <a:p>
-            <a:endParaRPr/>
-          </a:p>
-        </p:txBody>
-      </p:sp>
-      <p:sp>
-        <p:nvSpPr>
-          <p:cNvPr id="333" name="Shape 333"/>
+        <p:spPr/>
+      </p:sp>
+      <p:sp>
+        <p:nvSpPr>
+          <p:cNvPr id="3" name="备注占位符 2"/>
           <p:cNvSpPr>
             <a:spLocks noGrp="1"/>
           </p:cNvSpPr>
           <p:nvPr>
-            <p:ph type="body" sz="quarter" idx="1"/>
+            <p:ph type="body" idx="1"/>
           </p:nvPr>
         </p:nvSpPr>
-        <p:spPr>
-          <a:prstGeom prst="rect">
-            <a:avLst/>
-          </a:prstGeom>
-        </p:spPr>
+        <p:spPr/>
         <p:txBody>
           <a:bodyPr/>
           <a:lstStyle/>
           <a:p>
             <a:r>
-              <a:t>Read Slide</a:t>
-            </a:r>
+              <a:rPr kumimoji="1" lang="zh-CN" altLang="en-US" dirty="0"/>
+              <a:t>对静态数组的索引访问非常简单，直接用数组名</a:t>
+            </a:r>
+            <a:r>
+              <a:rPr kumimoji="1" lang="en-US" altLang="zh-CN" dirty="0"/>
+              <a:t>+</a:t>
+            </a:r>
+            <a:r>
+              <a:rPr kumimoji="1" lang="zh-CN" altLang="en-US" dirty="0"/>
+              <a:t>左方括号</a:t>
+            </a:r>
+            <a:r>
+              <a:rPr kumimoji="1" lang="en-US" altLang="zh-CN" dirty="0"/>
+              <a:t>+</a:t>
+            </a:r>
+            <a:r>
+              <a:rPr kumimoji="1" lang="zh-CN" altLang="en-US" dirty="0"/>
+              <a:t>索引值</a:t>
+            </a:r>
+            <a:r>
+              <a:rPr kumimoji="1" lang="en-US" altLang="zh-CN" dirty="0"/>
+              <a:t>+</a:t>
+            </a:r>
+            <a:r>
+              <a:rPr kumimoji="1" lang="zh-CN" altLang="en-US" dirty="0"/>
+              <a:t>右方括号。</a:t>
+            </a:r>
+            <a:endParaRPr kumimoji="1" lang="en-US" altLang="zh-CN" dirty="0"/>
+          </a:p>
+          <a:p>
+            <a:endParaRPr kumimoji="1" lang="en-US" altLang="zh-CN" dirty="0"/>
+          </a:p>
+          <a:p>
+            <a:r>
+              <a:rPr kumimoji="1" lang="zh-CN" altLang="en-US" dirty="0"/>
+              <a:t>比方说：</a:t>
+            </a:r>
+            <a:endParaRPr kumimoji="1" lang="en-US" altLang="zh-CN" dirty="0"/>
+          </a:p>
+          <a:p>
+            <a:endParaRPr kumimoji="1" lang="en-US" altLang="zh-CN" dirty="0"/>
+          </a:p>
+          <a:p>
+            <a:r>
+              <a:rPr kumimoji="1" lang="en-US" altLang="zh-CN" dirty="0"/>
+              <a:t>A[0] = 44</a:t>
+            </a:r>
+          </a:p>
+          <a:p>
+            <a:r>
+              <a:rPr kumimoji="1" lang="en-US" altLang="zh-CN" dirty="0"/>
+              <a:t>A[1] = 12</a:t>
+            </a:r>
+          </a:p>
+          <a:p>
+            <a:r>
+              <a:rPr kumimoji="1" lang="en-US" altLang="zh-CN" dirty="0"/>
+              <a:t>A[4] = 6</a:t>
+            </a:r>
+          </a:p>
+          <a:p>
+            <a:r>
+              <a:rPr kumimoji="1" lang="en-US" altLang="zh-CN" dirty="0"/>
+              <a:t>A[7] = 9</a:t>
+            </a:r>
+          </a:p>
+          <a:p>
+            <a:endParaRPr kumimoji="1" lang="en-US" altLang="zh-CN" dirty="0"/>
+          </a:p>
+          <a:p>
+            <a:r>
+              <a:rPr kumimoji="1" lang="zh-CN" altLang="en-US" dirty="0"/>
+              <a:t>但是，当我们试图去访问</a:t>
+            </a:r>
+            <a:r>
+              <a:rPr kumimoji="1" lang="en-US" altLang="zh-CN" dirty="0"/>
+              <a:t>A[9]</a:t>
+            </a:r>
+            <a:r>
+              <a:rPr kumimoji="1" lang="zh-CN" altLang="en-US" dirty="0"/>
+              <a:t>的时候，会出现数组越界</a:t>
+            </a:r>
+            <a:r>
+              <a:rPr kumimoji="1" lang="en-US" altLang="zh-CN" dirty="0"/>
+              <a:t>index out of bounds</a:t>
+            </a:r>
+            <a:r>
+              <a:rPr kumimoji="1" lang="zh-CN" altLang="en-US" dirty="0"/>
+              <a:t>错误，因为这个索引位置不存在。有</a:t>
+            </a:r>
+            <a:r>
+              <a:rPr kumimoji="1" lang="en-US" altLang="zh-CN" dirty="0"/>
+              <a:t>Java</a:t>
+            </a:r>
+            <a:r>
+              <a:rPr kumimoji="1" lang="zh-CN" altLang="en-US" dirty="0"/>
+              <a:t>开发经验的同学，应该经常有机会见到</a:t>
+            </a:r>
+            <a:r>
+              <a:rPr kumimoji="1" lang="en-US" altLang="zh-CN" dirty="0" err="1"/>
+              <a:t>ArrayIndexOutOfBoundsException</a:t>
+            </a:r>
+            <a:r>
+              <a:rPr kumimoji="1" lang="zh-CN" altLang="en-US" dirty="0"/>
+              <a:t>异常。</a:t>
+            </a:r>
+            <a:endParaRPr kumimoji="1" lang="en-US" altLang="zh-CN" dirty="0"/>
+          </a:p>
+          <a:p>
+            <a:endParaRPr kumimoji="1" lang="en-US" altLang="zh-CN" dirty="0"/>
+          </a:p>
+          <a:p>
+            <a:endParaRPr kumimoji="1" lang="en-US" altLang="zh-CN" dirty="0"/>
           </a:p>
         </p:txBody>
       </p:sp>
     </p:spTree>
+    <p:extLst>
+      <p:ext uri="{BB962C8B-B14F-4D97-AF65-F5344CB8AC3E}">
+        <p14:creationId xmlns:p14="http://schemas.microsoft.com/office/powerpoint/2010/main" val="2549483804"/>
+      </p:ext>
+    </p:extLst>
   </p:cSld>
   <p:clrMapOvr>
     <a:masterClrMapping/>
@@ -1207,7 +2482,7 @@
       </p:grpSpPr>
       <p:sp>
         <p:nvSpPr>
-          <p:cNvPr id="344" name="Shape 344"/>
+          <p:cNvPr id="2" name="幻灯片图像占位符 1"/>
           <p:cNvSpPr>
             <a:spLocks noGrp="1" noRot="1" noChangeAspect="1"/>
           </p:cNvSpPr>
@@ -1215,61 +2490,51 @@
             <p:ph type="sldImg"/>
           </p:nvPr>
         </p:nvSpPr>
-        <p:spPr>
-          <a:prstGeom prst="rect">
-            <a:avLst/>
-          </a:prstGeom>
-        </p:spPr>
-        <p:txBody>
-          <a:bodyPr/>
-          <a:lstStyle/>
-          <a:p>
-            <a:endParaRPr/>
-          </a:p>
-        </p:txBody>
-      </p:sp>
-      <p:sp>
-        <p:nvSpPr>
-          <p:cNvPr id="345" name="Shape 345"/>
+        <p:spPr/>
+      </p:sp>
+      <p:sp>
+        <p:nvSpPr>
+          <p:cNvPr id="3" name="备注占位符 2"/>
           <p:cNvSpPr>
             <a:spLocks noGrp="1"/>
           </p:cNvSpPr>
           <p:nvPr>
-            <p:ph type="body" sz="quarter" idx="1"/>
+            <p:ph type="body" idx="1"/>
           </p:nvPr>
         </p:nvSpPr>
-        <p:spPr>
-          <a:prstGeom prst="rect">
-            <a:avLst/>
-          </a:prstGeom>
-        </p:spPr>
+        <p:spPr/>
         <p:txBody>
           <a:bodyPr/>
           <a:lstStyle/>
           <a:p>
             <a:r>
-              <a:t>Read slide</a:t>
-            </a:r>
-          </a:p>
-          <a:p>
-            <a:endParaRPr/>
-          </a:p>
-          <a:p>
-            <a:r>
-              <a:t>Then we begin by adding elements one at a time. First 7, then -9 and 3. Oops we cannot fit 3 in our current static array so let’s double the size, copy our new elements into this new static array and now we can add 3 because we have two additional slots. Let’s add 12, ok still doing good for now let’s add five, oh we need to resize again, so copy all the elements into the new larger array. Now let’s finish off by adding -6. </a:t>
-            </a:r>
-          </a:p>
-          <a:p>
-            <a:endParaRPr/>
-          </a:p>
-          <a:p>
-            <a:r>
-              <a:t>In this example I decided to double the size, but we could also expand the new array size by factor of 1.5, by 3 or by 10 just not a number less than or equal to 1 and not 1.00001 either, something that will actually make some new cells. Also be mindful that too large expansions can easily lead to lots of wasted memory if those empty cells of the new static array are never used.</a:t>
-            </a:r>
+              <a:rPr kumimoji="1" lang="zh-CN" altLang="en-US" dirty="0"/>
+              <a:t>对数组元素赋值也简单，类似的语法：</a:t>
+            </a:r>
+            <a:endParaRPr kumimoji="1" lang="en-US" altLang="zh-CN" dirty="0"/>
+          </a:p>
+          <a:p>
+            <a:endParaRPr kumimoji="1" lang="en-US" altLang="zh-CN" dirty="0"/>
+          </a:p>
+          <a:p>
+            <a:r>
+              <a:rPr kumimoji="1" lang="zh-CN" altLang="en-US" dirty="0"/>
+              <a:t>例如，我们把第一个元素修改为</a:t>
+            </a:r>
+            <a:r>
+              <a:rPr kumimoji="1" lang="en-US" altLang="zh-CN" dirty="0"/>
+              <a:t>-1.</a:t>
+            </a:r>
+            <a:endParaRPr kumimoji="1" lang="zh-CN" altLang="en-US" dirty="0"/>
           </a:p>
         </p:txBody>
       </p:sp>
     </p:spTree>
+    <p:extLst>
+      <p:ext uri="{BB962C8B-B14F-4D97-AF65-F5344CB8AC3E}">
+        <p14:creationId xmlns:p14="http://schemas.microsoft.com/office/powerpoint/2010/main" val="3757218914"/>
+      </p:ext>
+    </p:extLst>
   </p:cSld>
   <p:clrMapOvr>
     <a:masterClrMapping/>
@@ -2960,7 +4225,7 @@
           </a:ln>
           <a:extLst>
             <a:ext uri="{C572A759-6A51-4108-AA02-DFA0A04FC94B}">
-              <ma14:wrappingTextBoxFlag xmlns:ma14="http://schemas.microsoft.com/office/mac/drawingml/2011/main" xmlns="" val="1"/>
+              <ma14:wrappingTextBoxFlag xmlns="" xmlns:ma14="http://schemas.microsoft.com/office/mac/drawingml/2011/main" val="1"/>
             </a:ext>
           </a:extLst>
         </p:spPr>
@@ -2999,7 +4264,7 @@
           </a:ln>
           <a:extLst>
             <a:ext uri="{C572A759-6A51-4108-AA02-DFA0A04FC94B}">
-              <ma14:wrappingTextBoxFlag xmlns:ma14="http://schemas.microsoft.com/office/mac/drawingml/2011/main" xmlns="" val="1"/>
+              <ma14:wrappingTextBoxFlag xmlns="" xmlns:ma14="http://schemas.microsoft.com/office/mac/drawingml/2011/main" val="1"/>
             </a:ext>
           </a:extLst>
         </p:spPr>
@@ -5552,7 +6817,7 @@
           </a:ln>
           <a:extLst>
             <a:ext uri="{C572A759-6A51-4108-AA02-DFA0A04FC94B}">
-              <ma14:wrappingTextBoxFlag xmlns:ma14="http://schemas.microsoft.com/office/mac/drawingml/2011/main" xmlns="" val="1"/>
+              <ma14:wrappingTextBoxFlag xmlns="" xmlns:ma14="http://schemas.microsoft.com/office/mac/drawingml/2011/main" val="1"/>
             </a:ext>
           </a:extLst>
         </p:spPr>
@@ -5933,7 +7198,7 @@
           </a:ln>
           <a:extLst>
             <a:ext uri="{C572A759-6A51-4108-AA02-DFA0A04FC94B}">
-              <ma14:wrappingTextBoxFlag xmlns:ma14="http://schemas.microsoft.com/office/mac/drawingml/2011/main" xmlns="" val="1"/>
+              <ma14:wrappingTextBoxFlag xmlns="" xmlns:ma14="http://schemas.microsoft.com/office/mac/drawingml/2011/main" val="1"/>
             </a:ext>
           </a:extLst>
         </p:spPr>
@@ -5968,7 +7233,7 @@
           </a:ln>
           <a:extLst>
             <a:ext uri="{C572A759-6A51-4108-AA02-DFA0A04FC94B}">
-              <ma14:wrappingTextBoxFlag xmlns:ma14="http://schemas.microsoft.com/office/mac/drawingml/2011/main" xmlns="" val="1"/>
+              <ma14:wrappingTextBoxFlag xmlns="" xmlns:ma14="http://schemas.microsoft.com/office/mac/drawingml/2011/main" val="1"/>
             </a:ext>
           </a:extLst>
         </p:spPr>
@@ -6003,7 +7268,7 @@
           </a:ln>
           <a:extLst>
             <a:ext uri="{C572A759-6A51-4108-AA02-DFA0A04FC94B}">
-              <ma14:wrappingTextBoxFlag xmlns:ma14="http://schemas.microsoft.com/office/mac/drawingml/2011/main" xmlns="" val="1"/>
+              <ma14:wrappingTextBoxFlag xmlns="" xmlns:ma14="http://schemas.microsoft.com/office/mac/drawingml/2011/main" val="1"/>
             </a:ext>
           </a:extLst>
         </p:spPr>
@@ -6038,7 +7303,7 @@
           </a:ln>
           <a:extLst>
             <a:ext uri="{C572A759-6A51-4108-AA02-DFA0A04FC94B}">
-              <ma14:wrappingTextBoxFlag xmlns:ma14="http://schemas.microsoft.com/office/mac/drawingml/2011/main" xmlns="" val="1"/>
+              <ma14:wrappingTextBoxFlag xmlns="" xmlns:ma14="http://schemas.microsoft.com/office/mac/drawingml/2011/main" val="1"/>
             </a:ext>
           </a:extLst>
         </p:spPr>
@@ -6073,7 +7338,7 @@
           </a:ln>
           <a:extLst>
             <a:ext uri="{C572A759-6A51-4108-AA02-DFA0A04FC94B}">
-              <ma14:wrappingTextBoxFlag xmlns:ma14="http://schemas.microsoft.com/office/mac/drawingml/2011/main" xmlns="" val="1"/>
+              <ma14:wrappingTextBoxFlag xmlns="" xmlns:ma14="http://schemas.microsoft.com/office/mac/drawingml/2011/main" val="1"/>
             </a:ext>
           </a:extLst>
         </p:spPr>
@@ -6108,7 +7373,7 @@
           </a:ln>
           <a:extLst>
             <a:ext uri="{C572A759-6A51-4108-AA02-DFA0A04FC94B}">
-              <ma14:wrappingTextBoxFlag xmlns:ma14="http://schemas.microsoft.com/office/mac/drawingml/2011/main" xmlns="" val="1"/>
+              <ma14:wrappingTextBoxFlag xmlns="" xmlns:ma14="http://schemas.microsoft.com/office/mac/drawingml/2011/main" val="1"/>
             </a:ext>
           </a:extLst>
         </p:spPr>
@@ -6143,7 +7408,7 @@
           </a:ln>
           <a:extLst>
             <a:ext uri="{C572A759-6A51-4108-AA02-DFA0A04FC94B}">
-              <ma14:wrappingTextBoxFlag xmlns:ma14="http://schemas.microsoft.com/office/mac/drawingml/2011/main" xmlns="" val="1"/>
+              <ma14:wrappingTextBoxFlag xmlns="" xmlns:ma14="http://schemas.microsoft.com/office/mac/drawingml/2011/main" val="1"/>
             </a:ext>
           </a:extLst>
         </p:spPr>
@@ -6703,7 +7968,7 @@
           </a:ln>
           <a:extLst>
             <a:ext uri="{C572A759-6A51-4108-AA02-DFA0A04FC94B}">
-              <ma14:wrappingTextBoxFlag xmlns:ma14="http://schemas.microsoft.com/office/mac/drawingml/2011/main" xmlns="" val="1"/>
+              <ma14:wrappingTextBoxFlag xmlns="" xmlns:ma14="http://schemas.microsoft.com/office/mac/drawingml/2011/main" val="1"/>
             </a:ext>
           </a:extLst>
         </p:spPr>
@@ -6738,7 +8003,7 @@
           </a:ln>
           <a:extLst>
             <a:ext uri="{C572A759-6A51-4108-AA02-DFA0A04FC94B}">
-              <ma14:wrappingTextBoxFlag xmlns:ma14="http://schemas.microsoft.com/office/mac/drawingml/2011/main" xmlns="" val="1"/>
+              <ma14:wrappingTextBoxFlag xmlns="" xmlns:ma14="http://schemas.microsoft.com/office/mac/drawingml/2011/main" val="1"/>
             </a:ext>
           </a:extLst>
         </p:spPr>
@@ -6773,7 +8038,7 @@
           </a:ln>
           <a:extLst>
             <a:ext uri="{C572A759-6A51-4108-AA02-DFA0A04FC94B}">
-              <ma14:wrappingTextBoxFlag xmlns:ma14="http://schemas.microsoft.com/office/mac/drawingml/2011/main" xmlns="" val="1"/>
+              <ma14:wrappingTextBoxFlag xmlns="" xmlns:ma14="http://schemas.microsoft.com/office/mac/drawingml/2011/main" val="1"/>
             </a:ext>
           </a:extLst>
         </p:spPr>
@@ -7754,7 +9019,7 @@
           </a:ln>
           <a:extLst>
             <a:ext uri="{C572A759-6A51-4108-AA02-DFA0A04FC94B}">
-              <ma14:wrappingTextBoxFlag xmlns:ma14="http://schemas.microsoft.com/office/mac/drawingml/2011/main" xmlns="" val="1"/>
+              <ma14:wrappingTextBoxFlag xmlns="" xmlns:ma14="http://schemas.microsoft.com/office/mac/drawingml/2011/main" val="1"/>
             </a:ext>
           </a:extLst>
         </p:spPr>
@@ -8173,7 +9438,7 @@
           </a:ln>
           <a:extLst>
             <a:ext uri="{C572A759-6A51-4108-AA02-DFA0A04FC94B}">
-              <ma14:wrappingTextBoxFlag xmlns:ma14="http://schemas.microsoft.com/office/mac/drawingml/2011/main" xmlns="" val="1"/>
+              <ma14:wrappingTextBoxFlag xmlns="" xmlns:ma14="http://schemas.microsoft.com/office/mac/drawingml/2011/main" val="1"/>
             </a:ext>
           </a:extLst>
         </p:spPr>
@@ -8208,7 +9473,7 @@
           </a:ln>
           <a:extLst>
             <a:ext uri="{C572A759-6A51-4108-AA02-DFA0A04FC94B}">
-              <ma14:wrappingTextBoxFlag xmlns:ma14="http://schemas.microsoft.com/office/mac/drawingml/2011/main" xmlns="" val="1"/>
+              <ma14:wrappingTextBoxFlag xmlns="" xmlns:ma14="http://schemas.microsoft.com/office/mac/drawingml/2011/main" val="1"/>
             </a:ext>
           </a:extLst>
         </p:spPr>
@@ -8243,7 +9508,7 @@
           </a:ln>
           <a:extLst>
             <a:ext uri="{C572A759-6A51-4108-AA02-DFA0A04FC94B}">
-              <ma14:wrappingTextBoxFlag xmlns:ma14="http://schemas.microsoft.com/office/mac/drawingml/2011/main" xmlns="" val="1"/>
+              <ma14:wrappingTextBoxFlag xmlns="" xmlns:ma14="http://schemas.microsoft.com/office/mac/drawingml/2011/main" val="1"/>
             </a:ext>
           </a:extLst>
         </p:spPr>
@@ -8278,7 +9543,7 @@
           </a:ln>
           <a:extLst>
             <a:ext uri="{C572A759-6A51-4108-AA02-DFA0A04FC94B}">
-              <ma14:wrappingTextBoxFlag xmlns:ma14="http://schemas.microsoft.com/office/mac/drawingml/2011/main" xmlns="" val="1"/>
+              <ma14:wrappingTextBoxFlag xmlns="" xmlns:ma14="http://schemas.microsoft.com/office/mac/drawingml/2011/main" val="1"/>
             </a:ext>
           </a:extLst>
         </p:spPr>
@@ -8313,7 +9578,7 @@
           </a:ln>
           <a:extLst>
             <a:ext uri="{C572A759-6A51-4108-AA02-DFA0A04FC94B}">
-              <ma14:wrappingTextBoxFlag xmlns:ma14="http://schemas.microsoft.com/office/mac/drawingml/2011/main" xmlns="" val="1"/>
+              <ma14:wrappingTextBoxFlag xmlns="" xmlns:ma14="http://schemas.microsoft.com/office/mac/drawingml/2011/main" val="1"/>
             </a:ext>
           </a:extLst>
         </p:spPr>
@@ -8477,7 +9742,7 @@
           </a:ln>
           <a:extLst>
             <a:ext uri="{C572A759-6A51-4108-AA02-DFA0A04FC94B}">
-              <ma14:wrappingTextBoxFlag xmlns:ma14="http://schemas.microsoft.com/office/mac/drawingml/2011/main" xmlns="" val="1"/>
+              <ma14:wrappingTextBoxFlag xmlns="" xmlns:ma14="http://schemas.microsoft.com/office/mac/drawingml/2011/main" val="1"/>
             </a:ext>
           </a:extLst>
         </p:spPr>
@@ -8684,7 +9949,7 @@
           </a:ln>
           <a:extLst>
             <a:ext uri="{C572A759-6A51-4108-AA02-DFA0A04FC94B}">
-              <ma14:wrappingTextBoxFlag xmlns:ma14="http://schemas.microsoft.com/office/mac/drawingml/2011/main" xmlns="" val="1"/>
+              <ma14:wrappingTextBoxFlag xmlns="" xmlns:ma14="http://schemas.microsoft.com/office/mac/drawingml/2011/main" val="1"/>
             </a:ext>
           </a:extLst>
         </p:spPr>
@@ -8723,7 +9988,7 @@
           </a:ln>
           <a:extLst>
             <a:ext uri="{C572A759-6A51-4108-AA02-DFA0A04FC94B}">
-              <ma14:wrappingTextBoxFlag xmlns:ma14="http://schemas.microsoft.com/office/mac/drawingml/2011/main" xmlns="" val="1"/>
+              <ma14:wrappingTextBoxFlag xmlns="" xmlns:ma14="http://schemas.microsoft.com/office/mac/drawingml/2011/main" val="1"/>
             </a:ext>
           </a:extLst>
         </p:spPr>
@@ -8949,7 +10214,7 @@
           </a:ln>
           <a:extLst>
             <a:ext uri="{C572A759-6A51-4108-AA02-DFA0A04FC94B}">
-              <ma14:wrappingTextBoxFlag xmlns:ma14="http://schemas.microsoft.com/office/mac/drawingml/2011/main" xmlns="" val="1"/>
+              <ma14:wrappingTextBoxFlag xmlns="" xmlns:ma14="http://schemas.microsoft.com/office/mac/drawingml/2011/main" val="1"/>
             </a:ext>
           </a:extLst>
         </p:spPr>
@@ -8988,7 +10253,7 @@
           </a:ln>
           <a:extLst>
             <a:ext uri="{C572A759-6A51-4108-AA02-DFA0A04FC94B}">
-              <ma14:wrappingTextBoxFlag xmlns:ma14="http://schemas.microsoft.com/office/mac/drawingml/2011/main" xmlns="" val="1"/>
+              <ma14:wrappingTextBoxFlag xmlns="" xmlns:ma14="http://schemas.microsoft.com/office/mac/drawingml/2011/main" val="1"/>
             </a:ext>
           </a:extLst>
         </p:spPr>
@@ -9262,7 +10527,7 @@
           </a:ln>
           <a:extLst>
             <a:ext uri="{C572A759-6A51-4108-AA02-DFA0A04FC94B}">
-              <ma14:wrappingTextBoxFlag xmlns:ma14="http://schemas.microsoft.com/office/mac/drawingml/2011/main" xmlns="" val="1"/>
+              <ma14:wrappingTextBoxFlag xmlns="" xmlns:ma14="http://schemas.microsoft.com/office/mac/drawingml/2011/main" val="1"/>
             </a:ext>
           </a:extLst>
         </p:spPr>
@@ -9301,7 +10566,7 @@
           </a:ln>
           <a:extLst>
             <a:ext uri="{C572A759-6A51-4108-AA02-DFA0A04FC94B}">
-              <ma14:wrappingTextBoxFlag xmlns:ma14="http://schemas.microsoft.com/office/mac/drawingml/2011/main" xmlns="" val="1"/>
+              <ma14:wrappingTextBoxFlag xmlns="" xmlns:ma14="http://schemas.microsoft.com/office/mac/drawingml/2011/main" val="1"/>
             </a:ext>
           </a:extLst>
         </p:spPr>
@@ -9527,7 +10792,7 @@
           </a:ln>
           <a:extLst>
             <a:ext uri="{C572A759-6A51-4108-AA02-DFA0A04FC94B}">
-              <ma14:wrappingTextBoxFlag xmlns:ma14="http://schemas.microsoft.com/office/mac/drawingml/2011/main" xmlns="" val="1"/>
+              <ma14:wrappingTextBoxFlag xmlns="" xmlns:ma14="http://schemas.microsoft.com/office/mac/drawingml/2011/main" val="1"/>
             </a:ext>
           </a:extLst>
         </p:spPr>
@@ -9623,7 +10888,7 @@
           </a:ln>
           <a:extLst>
             <a:ext uri="{C572A759-6A51-4108-AA02-DFA0A04FC94B}">
-              <ma14:wrappingTextBoxFlag xmlns:ma14="http://schemas.microsoft.com/office/mac/drawingml/2011/main" xmlns="" val="1"/>
+              <ma14:wrappingTextBoxFlag xmlns="" xmlns:ma14="http://schemas.microsoft.com/office/mac/drawingml/2011/main" val="1"/>
             </a:ext>
           </a:extLst>
         </p:spPr>
@@ -9671,7 +10936,7 @@
           </a:ln>
           <a:extLst>
             <a:ext uri="{C572A759-6A51-4108-AA02-DFA0A04FC94B}">
-              <ma14:wrappingTextBoxFlag xmlns:ma14="http://schemas.microsoft.com/office/mac/drawingml/2011/main" xmlns="" val="1"/>
+              <ma14:wrappingTextBoxFlag xmlns="" xmlns:ma14="http://schemas.microsoft.com/office/mac/drawingml/2011/main" val="1"/>
             </a:ext>
           </a:extLst>
         </p:spPr>
@@ -9719,7 +10984,7 @@
           </a:ln>
           <a:extLst>
             <a:ext uri="{C572A759-6A51-4108-AA02-DFA0A04FC94B}">
-              <ma14:wrappingTextBoxFlag xmlns:ma14="http://schemas.microsoft.com/office/mac/drawingml/2011/main" xmlns="" val="1"/>
+              <ma14:wrappingTextBoxFlag xmlns="" xmlns:ma14="http://schemas.microsoft.com/office/mac/drawingml/2011/main" val="1"/>
             </a:ext>
           </a:extLst>
         </p:spPr>
@@ -10261,7 +11526,7 @@
           </a:ln>
           <a:extLst>
             <a:ext uri="{C572A759-6A51-4108-AA02-DFA0A04FC94B}">
-              <ma14:wrappingTextBoxFlag xmlns:ma14="http://schemas.microsoft.com/office/mac/drawingml/2011/main" xmlns="" val="1"/>
+              <ma14:wrappingTextBoxFlag xmlns="" xmlns:ma14="http://schemas.microsoft.com/office/mac/drawingml/2011/main" val="1"/>
             </a:ext>
           </a:extLst>
         </p:spPr>
@@ -11976,7 +13241,7 @@
             </a:pPr>
             <a:r>
               <a:rPr lang="en" dirty="0" err="1"/>
-              <a:t>讨论数组并给出样例</a:t>
+              <a:t>介绍数组并给出样例</a:t>
             </a:r>
             <a:endParaRPr lang="en" dirty="0">
               <a:solidFill>
@@ -12118,8 +13383,12 @@
           </a:lstStyle>
           <a:p>
             <a:r>
+              <a:rPr lang="zh-CN" altLang="en-US"/>
+              <a:t>介绍和</a:t>
+            </a:r>
+            <a:r>
               <a:rPr lang="zh-CN" altLang="en-US" dirty="0"/>
-              <a:t>讨论和样例</a:t>
+              <a:t>样例</a:t>
             </a:r>
             <a:endParaRPr dirty="0"/>
           </a:p>
@@ -12204,7 +13473,7 @@
           </a:ln>
           <a:extLst>
             <a:ext uri="{C572A759-6A51-4108-AA02-DFA0A04FC94B}">
-              <ma14:wrappingTextBoxFlag xmlns:ma14="http://schemas.microsoft.com/office/mac/drawingml/2011/main" xmlns="" val="1"/>
+              <ma14:wrappingTextBoxFlag xmlns="" xmlns:ma14="http://schemas.microsoft.com/office/mac/drawingml/2011/main" val="1"/>
             </a:ext>
           </a:extLst>
         </p:spPr>
@@ -12265,7 +13534,7 @@
           </a:ln>
           <a:extLst>
             <a:ext uri="{C572A759-6A51-4108-AA02-DFA0A04FC94B}">
-              <ma14:wrappingTextBoxFlag xmlns:ma14="http://schemas.microsoft.com/office/mac/drawingml/2011/main" xmlns="" val="1"/>
+              <ma14:wrappingTextBoxFlag xmlns="" xmlns:ma14="http://schemas.microsoft.com/office/mac/drawingml/2011/main" val="1"/>
             </a:ext>
           </a:extLst>
         </p:spPr>
@@ -12390,7 +13659,7 @@
           </a:ln>
           <a:extLst>
             <a:ext uri="{C572A759-6A51-4108-AA02-DFA0A04FC94B}">
-              <ma14:wrappingTextBoxFlag xmlns:ma14="http://schemas.microsoft.com/office/mac/drawingml/2011/main" xmlns="" val="1"/>
+              <ma14:wrappingTextBoxFlag xmlns="" xmlns:ma14="http://schemas.microsoft.com/office/mac/drawingml/2011/main" val="1"/>
             </a:ext>
           </a:extLst>
         </p:spPr>
@@ -13300,7 +14569,7 @@
           </a:ln>
           <a:extLst>
             <a:ext uri="{C572A759-6A51-4108-AA02-DFA0A04FC94B}">
-              <ma14:wrappingTextBoxFlag xmlns:ma14="http://schemas.microsoft.com/office/mac/drawingml/2011/main" xmlns="" val="1"/>
+              <ma14:wrappingTextBoxFlag xmlns="" xmlns:ma14="http://schemas.microsoft.com/office/mac/drawingml/2011/main" val="1"/>
             </a:ext>
           </a:extLst>
         </p:spPr>
@@ -13341,7 +14610,7 @@
           </a:ln>
           <a:extLst>
             <a:ext uri="{C572A759-6A51-4108-AA02-DFA0A04FC94B}">
-              <ma14:wrappingTextBoxFlag xmlns:ma14="http://schemas.microsoft.com/office/mac/drawingml/2011/main" xmlns="" val="1"/>
+              <ma14:wrappingTextBoxFlag xmlns="" xmlns:ma14="http://schemas.microsoft.com/office/mac/drawingml/2011/main" val="1"/>
             </a:ext>
           </a:extLst>
         </p:spPr>
@@ -14385,7 +15654,7 @@
           </a:ln>
           <a:extLst>
             <a:ext uri="{C572A759-6A51-4108-AA02-DFA0A04FC94B}">
-              <ma14:wrappingTextBoxFlag xmlns:ma14="http://schemas.microsoft.com/office/mac/drawingml/2011/main" xmlns="" val="1"/>
+              <ma14:wrappingTextBoxFlag xmlns="" xmlns:ma14="http://schemas.microsoft.com/office/mac/drawingml/2011/main" val="1"/>
             </a:ext>
           </a:extLst>
         </p:spPr>
@@ -15108,7 +16377,7 @@
           </a:ln>
           <a:extLst>
             <a:ext uri="{C572A759-6A51-4108-AA02-DFA0A04FC94B}">
-              <ma14:wrappingTextBoxFlag xmlns:ma14="http://schemas.microsoft.com/office/mac/drawingml/2011/main" xmlns="" val="1"/>
+              <ma14:wrappingTextBoxFlag xmlns="" xmlns:ma14="http://schemas.microsoft.com/office/mac/drawingml/2011/main" val="1"/>
             </a:ext>
           </a:extLst>
         </p:spPr>
@@ -16192,7 +17461,7 @@
           </a:ln>
           <a:extLst>
             <a:ext uri="{C572A759-6A51-4108-AA02-DFA0A04FC94B}">
-              <ma14:wrappingTextBoxFlag xmlns:ma14="http://schemas.microsoft.com/office/mac/drawingml/2011/main" xmlns="" val="1"/>
+              <ma14:wrappingTextBoxFlag xmlns="" xmlns:ma14="http://schemas.microsoft.com/office/mac/drawingml/2011/main" val="1"/>
             </a:ext>
           </a:extLst>
         </p:spPr>
@@ -16915,7 +18184,7 @@
           </a:ln>
           <a:extLst>
             <a:ext uri="{C572A759-6A51-4108-AA02-DFA0A04FC94B}">
-              <ma14:wrappingTextBoxFlag xmlns:ma14="http://schemas.microsoft.com/office/mac/drawingml/2011/main" xmlns="" val="1"/>
+              <ma14:wrappingTextBoxFlag xmlns="" xmlns:ma14="http://schemas.microsoft.com/office/mac/drawingml/2011/main" val="1"/>
             </a:ext>
           </a:extLst>
         </p:spPr>
@@ -16950,7 +18219,7 @@
           </a:ln>
           <a:extLst>
             <a:ext uri="{C572A759-6A51-4108-AA02-DFA0A04FC94B}">
-              <ma14:wrappingTextBoxFlag xmlns:ma14="http://schemas.microsoft.com/office/mac/drawingml/2011/main" xmlns="" val="1"/>
+              <ma14:wrappingTextBoxFlag xmlns="" xmlns:ma14="http://schemas.microsoft.com/office/mac/drawingml/2011/main" val="1"/>
             </a:ext>
           </a:extLst>
         </p:spPr>
@@ -16985,7 +18254,7 @@
           </a:ln>
           <a:extLst>
             <a:ext uri="{C572A759-6A51-4108-AA02-DFA0A04FC94B}">
-              <ma14:wrappingTextBoxFlag xmlns:ma14="http://schemas.microsoft.com/office/mac/drawingml/2011/main" xmlns="" val="1"/>
+              <ma14:wrappingTextBoxFlag xmlns="" xmlns:ma14="http://schemas.microsoft.com/office/mac/drawingml/2011/main" val="1"/>
             </a:ext>
           </a:extLst>
         </p:spPr>
@@ -17020,7 +18289,7 @@
           </a:ln>
           <a:extLst>
             <a:ext uri="{C572A759-6A51-4108-AA02-DFA0A04FC94B}">
-              <ma14:wrappingTextBoxFlag xmlns:ma14="http://schemas.microsoft.com/office/mac/drawingml/2011/main" xmlns="" val="1"/>
+              <ma14:wrappingTextBoxFlag xmlns="" xmlns:ma14="http://schemas.microsoft.com/office/mac/drawingml/2011/main" val="1"/>
             </a:ext>
           </a:extLst>
         </p:spPr>
@@ -17055,7 +18324,7 @@
           </a:ln>
           <a:extLst>
             <a:ext uri="{C572A759-6A51-4108-AA02-DFA0A04FC94B}">
-              <ma14:wrappingTextBoxFlag xmlns:ma14="http://schemas.microsoft.com/office/mac/drawingml/2011/main" xmlns="" val="1"/>
+              <ma14:wrappingTextBoxFlag xmlns="" xmlns:ma14="http://schemas.microsoft.com/office/mac/drawingml/2011/main" val="1"/>
             </a:ext>
           </a:extLst>
         </p:spPr>
@@ -19053,7 +20322,7 @@
           </a:ln>
           <a:extLst>
             <a:ext uri="{C572A759-6A51-4108-AA02-DFA0A04FC94B}">
-              <ma14:wrappingTextBoxFlag xmlns:ma14="http://schemas.microsoft.com/office/mac/drawingml/2011/main" xmlns="" val="1"/>
+              <ma14:wrappingTextBoxFlag xmlns="" xmlns:ma14="http://schemas.microsoft.com/office/mac/drawingml/2011/main" val="1"/>
             </a:ext>
           </a:extLst>
         </p:spPr>
@@ -19472,7 +20741,7 @@
           </a:ln>
           <a:extLst>
             <a:ext uri="{C572A759-6A51-4108-AA02-DFA0A04FC94B}">
-              <ma14:wrappingTextBoxFlag xmlns:ma14="http://schemas.microsoft.com/office/mac/drawingml/2011/main" xmlns="" val="1"/>
+              <ma14:wrappingTextBoxFlag xmlns="" xmlns:ma14="http://schemas.microsoft.com/office/mac/drawingml/2011/main" val="1"/>
             </a:ext>
           </a:extLst>
         </p:spPr>
@@ -19507,7 +20776,7 @@
           </a:ln>
           <a:extLst>
             <a:ext uri="{C572A759-6A51-4108-AA02-DFA0A04FC94B}">
-              <ma14:wrappingTextBoxFlag xmlns:ma14="http://schemas.microsoft.com/office/mac/drawingml/2011/main" xmlns="" val="1"/>
+              <ma14:wrappingTextBoxFlag xmlns="" xmlns:ma14="http://schemas.microsoft.com/office/mac/drawingml/2011/main" val="1"/>
             </a:ext>
           </a:extLst>
         </p:spPr>
@@ -19542,7 +20811,7 @@
           </a:ln>
           <a:extLst>
             <a:ext uri="{C572A759-6A51-4108-AA02-DFA0A04FC94B}">
-              <ma14:wrappingTextBoxFlag xmlns:ma14="http://schemas.microsoft.com/office/mac/drawingml/2011/main" xmlns="" val="1"/>
+              <ma14:wrappingTextBoxFlag xmlns="" xmlns:ma14="http://schemas.microsoft.com/office/mac/drawingml/2011/main" val="1"/>
             </a:ext>
           </a:extLst>
         </p:spPr>
@@ -19577,7 +20846,7 @@
           </a:ln>
           <a:extLst>
             <a:ext uri="{C572A759-6A51-4108-AA02-DFA0A04FC94B}">
-              <ma14:wrappingTextBoxFlag xmlns:ma14="http://schemas.microsoft.com/office/mac/drawingml/2011/main" xmlns="" val="1"/>
+              <ma14:wrappingTextBoxFlag xmlns="" xmlns:ma14="http://schemas.microsoft.com/office/mac/drawingml/2011/main" val="1"/>
             </a:ext>
           </a:extLst>
         </p:spPr>
@@ -19612,7 +20881,7 @@
           </a:ln>
           <a:extLst>
             <a:ext uri="{C572A759-6A51-4108-AA02-DFA0A04FC94B}">
-              <ma14:wrappingTextBoxFlag xmlns:ma14="http://schemas.microsoft.com/office/mac/drawingml/2011/main" xmlns="" val="1"/>
+              <ma14:wrappingTextBoxFlag xmlns="" xmlns:ma14="http://schemas.microsoft.com/office/mac/drawingml/2011/main" val="1"/>
             </a:ext>
           </a:extLst>
         </p:spPr>
@@ -19647,7 +20916,7 @@
           </a:ln>
           <a:extLst>
             <a:ext uri="{C572A759-6A51-4108-AA02-DFA0A04FC94B}">
-              <ma14:wrappingTextBoxFlag xmlns:ma14="http://schemas.microsoft.com/office/mac/drawingml/2011/main" xmlns="" val="1"/>
+              <ma14:wrappingTextBoxFlag xmlns="" xmlns:ma14="http://schemas.microsoft.com/office/mac/drawingml/2011/main" val="1"/>
             </a:ext>
           </a:extLst>
         </p:spPr>

</xml_diff>

<commit_message>
add linked list slide
</commit_message>
<xml_diff>
--- a/slides/datastructures/dynamic_array/Arrays.pptx
+++ b/slides/datastructures/dynamic_array/Arrays.pptx
@@ -576,6 +576,14 @@
           <a:p>
             <a:r>
               <a:rPr lang="en-US" dirty="0" err="1"/>
+              <a:t>欢迎回到波波微课</a:t>
+            </a:r>
+            <a:r>
+              <a:rPr lang="zh-CN" altLang="en-US"/>
+              <a:t>，</a:t>
+            </a:r>
+            <a:r>
+              <a:rPr lang="en-US"/>
               <a:t>今天我们来学习数组</a:t>
             </a:r>
             <a:r>
@@ -656,7 +664,15 @@
           <a:p>
             <a:r>
               <a:rPr kumimoji="1" lang="zh-CN" altLang="en-US" dirty="0"/>
-              <a:t>再把第五个元素修改为</a:t>
+              <a:t>再把索引为</a:t>
+            </a:r>
+            <a:r>
+              <a:rPr kumimoji="1" lang="en-US" altLang="zh-CN" dirty="0"/>
+              <a:t>5</a:t>
+            </a:r>
+            <a:r>
+              <a:rPr kumimoji="1" lang="zh-CN" altLang="en-US" dirty="0"/>
+              <a:t>的元素修改为</a:t>
             </a:r>
             <a:r>
               <a:rPr kumimoji="1" lang="en-US" altLang="zh-CN" dirty="0"/>
@@ -728,7 +744,7 @@
           <a:p>
             <a:r>
               <a:rPr kumimoji="1" lang="zh-CN" altLang="en-US" dirty="0"/>
-              <a:t>再把第</a:t>
+              <a:t>再把索引为</a:t>
             </a:r>
             <a:r>
               <a:rPr kumimoji="1" lang="en-US" altLang="zh-CN" dirty="0"/>
@@ -736,7 +752,7 @@
             </a:r>
             <a:r>
               <a:rPr kumimoji="1" lang="zh-CN" altLang="en-US" dirty="0"/>
-              <a:t>个元素修改为</a:t>
+              <a:t>的元素修改为</a:t>
             </a:r>
             <a:r>
               <a:rPr kumimoji="1" lang="en-US" altLang="zh-CN" dirty="0"/>
@@ -1117,7 +1133,7 @@
             </a:pPr>
             <a:r>
               <a:rPr lang="zh-CN" altLang="en-US" dirty="0"/>
-              <a:t>后续如果继续添加元素会超出静态数组的容量，那么就创建一个具有两倍容量的新数组，并将原数组的内容拷贝到新数组当中去。</a:t>
+              <a:t>后续，如果继续添加元素会超出静态数组的容量，那么就创建一个具有两倍容量的新数组，并将原数组的内容拷贝到新数组当中去。</a:t>
             </a:r>
             <a:endParaRPr lang="en-US" altLang="zh-CN" dirty="0"/>
           </a:p>
@@ -1204,7 +1220,7 @@
           <a:p>
             <a:r>
               <a:rPr lang="zh-CN" altLang="en-US" dirty="0"/>
-              <a:t>下面看一个动态数组的演示样例，</a:t>
+              <a:t>最后，我们来看一个动态数组的演示样例，</a:t>
             </a:r>
             <a:endParaRPr lang="en-US" altLang="zh-CN" dirty="0"/>
           </a:p>
@@ -1374,7 +1390,7 @@
           <a:p>
             <a:r>
               <a:rPr lang="zh-CN" altLang="en-US" dirty="0"/>
-              <a:t>在这个例子中，我们每次将静态数组的大小扩大一倍，但是其实也可以每次扩大到原来的</a:t>
+              <a:t>在这个例子中，我们每次将静态数组的大小扩大到原来的两倍，但是其实也可以每次扩大到原来的</a:t>
             </a:r>
             <a:r>
               <a:rPr lang="en-US" altLang="zh-CN" dirty="0"/>
@@ -1399,6 +1415,38 @@
             <a:r>
               <a:rPr lang="zh-CN" altLang="en-US" dirty="0"/>
               <a:t>倍。但是要注意，如果扩大的空间太大，容易造成内存空间浪费，因为有可能这些扩大的空元素位置一直用不到，结果白白占据了内存空间。</a:t>
+            </a:r>
+            <a:endParaRPr lang="en-US" altLang="zh-CN" dirty="0"/>
+          </a:p>
+          <a:p>
+            <a:endParaRPr lang="en-US" dirty="0"/>
+          </a:p>
+          <a:p>
+            <a:r>
+              <a:rPr lang="zh-CN" altLang="en-US" dirty="0"/>
+              <a:t>好的，这节课关于静态数组和动态数组的内容，就先讲到这边。</a:t>
+            </a:r>
+            <a:endParaRPr lang="en-US" altLang="zh-CN" dirty="0"/>
+          </a:p>
+          <a:p>
+            <a:endParaRPr lang="en-US" altLang="zh-CN" dirty="0"/>
+          </a:p>
+          <a:p>
+            <a:r>
+              <a:rPr lang="zh-CN" altLang="en-US" dirty="0"/>
+              <a:t>在下节课，波波</a:t>
+            </a:r>
+            <a:r>
+              <a:rPr lang="zh-CN" altLang="en-US"/>
+              <a:t>会通过实际代码，演示如何</a:t>
+            </a:r>
+            <a:r>
+              <a:rPr lang="zh-CN" altLang="en-US" dirty="0"/>
+              <a:t>通过静态数组实现一个动态数组类。好，我们下</a:t>
+            </a:r>
+            <a:r>
+              <a:rPr lang="zh-CN" altLang="en-US"/>
+              <a:t>节课再见！</a:t>
             </a:r>
             <a:endParaRPr lang="en-US" dirty="0"/>
           </a:p>
@@ -1666,7 +1714,7 @@
           <a:p>
             <a:r>
               <a:rPr lang="zh-CN" altLang="en-US" dirty="0"/>
-              <a:t>所谓静态数组，它是一个包含</a:t>
+              <a:t>所谓静态数组，就是一个包含</a:t>
             </a:r>
             <a:r>
               <a:rPr lang="en-US" altLang="zh-CN" dirty="0"/>
@@ -1781,7 +1829,7 @@
           <a:p>
             <a:r>
               <a:rPr lang="zh-CN" altLang="en-US" dirty="0"/>
-              <a:t>当然，首先数组可以用于存储和访问顺序数据，还可以存储临时对象，这些你可能已经实际用过了。</a:t>
+              <a:t>首先，数组当然可以用于存储和访问顺序数据，其次，数组还可以存储临时对象，这些你都可能已经实际使用过了。</a:t>
             </a:r>
             <a:endParaRPr lang="en-US" dirty="0"/>
           </a:p>
@@ -1790,12 +1838,8 @@
           </a:p>
           <a:p>
             <a:r>
-              <a:rPr lang="en-US" dirty="0" err="1"/>
-              <a:t>其次</a:t>
-            </a:r>
-            <a:r>
               <a:rPr lang="zh-CN" altLang="en-US" dirty="0"/>
-              <a:t>，数组也可以用作输入</a:t>
+              <a:t>第三，数组也可以用作输入</a:t>
             </a:r>
             <a:r>
               <a:rPr lang="en-US" altLang="zh-CN" dirty="0"/>
@@ -1803,7 +1847,7 @@
             </a:r>
             <a:r>
               <a:rPr lang="zh-CN" altLang="en-US" dirty="0"/>
-              <a:t>输出流的缓冲区。假设我们需要处理一个非常大的文件，这个文件太大以至于无法一下子装入内存，于是我们可以利用数组作为缓冲</a:t>
+              <a:t>输出流的缓冲区。假设我们需要处理一个非常大的文件，这个文件太大以至于无法一下子装入内存，那么我们就可以利用数组作为缓冲</a:t>
             </a:r>
             <a:r>
               <a:rPr lang="en-US" altLang="zh-CN" dirty="0"/>
@@ -1821,7 +1865,7 @@
           <a:p>
             <a:r>
               <a:rPr lang="zh-CN" altLang="en-US" dirty="0"/>
-              <a:t>第三个，数组也可以用作查找表，因为它们具有索引属性。只需要知道数据在查找表中的索引或者偏移量，你就可以很容易从查找表找找到对应的数据。</a:t>
+              <a:t>第四，数组也可以用作查找表，因为它们具有索引特性。只需要知道数据在查找表中的索引或者偏移量，你就可以很容易从查找表找找到对应的数据。</a:t>
             </a:r>
             <a:endParaRPr dirty="0"/>
           </a:p>
@@ -1831,7 +1875,7 @@
           <a:p>
             <a:r>
               <a:rPr lang="zh-CN" altLang="en-US" dirty="0"/>
-              <a:t>第四个，如果某种语言的函数只允许返回一个返回值，那么利用数组作为中介，通过返回数组的引用或者指针，你就可以同时返回多个返回值。</a:t>
+              <a:t>第五，如果某种语言的函数只允许返回一个返回值，那么利用数组作为中介，通过返回数组的引用或者指针，你就可以同时返回多个返回值。</a:t>
             </a:r>
             <a:endParaRPr dirty="0"/>
           </a:p>
@@ -1946,7 +1990,7 @@
           <a:p>
             <a:r>
               <a:rPr lang="en-US" dirty="0" err="1"/>
-              <a:t>对于访问时间</a:t>
+              <a:t>对于访问操作</a:t>
             </a:r>
             <a:r>
               <a:rPr lang="zh-CN" altLang="en-US" dirty="0"/>
@@ -2030,7 +2074,7 @@
             </a:r>
             <a:r>
               <a:rPr lang="zh-CN" altLang="en-US" dirty="0"/>
-              <a:t>，它是常量级的。你可能会有疑问，因为有的时候当你添加元素的时候，内部的静态数组容量不够了，你需要重新分配一个更大容量的静态数组。这种情况确实存在，但是它发生的情况只是少数，最后平摊下来的结果，复杂度还是常量级的。</a:t>
+              <a:t>，它是常量级的。你可能会有疑问，因为有的时候当你添加元素的时候，内部的静态数组容量不够了，你就需要重新分配一个更大容量的静态数组。这种情况确实存在，但是它发生的情况只是少数，最后平摊下来的结果，复杂度还是常量级的。</a:t>
             </a:r>
             <a:endParaRPr dirty="0"/>
           </a:p>
@@ -2261,7 +2305,7 @@
             </a:r>
             <a:r>
               <a:rPr lang="zh-CN" altLang="en-US" dirty="0"/>
-              <a:t>循环对数组进行迭代，这时候，语句中不需要引用下标，当然实际底层还是会使用下标的，</a:t>
+              <a:t>循环对数组进行迭代，这时候，语句中不需要引用索引，当然实际底层还是会使用索引的，</a:t>
             </a:r>
             <a:r>
               <a:rPr lang="en-US" altLang="zh-CN" dirty="0"/>
@@ -2438,7 +2482,7 @@
             </a:r>
             <a:r>
               <a:rPr kumimoji="1" lang="zh-CN" altLang="en-US" dirty="0"/>
-              <a:t>异常。</a:t>
+              <a:t>。</a:t>
             </a:r>
             <a:endParaRPr kumimoji="1" lang="en-US" altLang="zh-CN" dirty="0"/>
           </a:p>
@@ -2509,7 +2553,7 @@
           <a:p>
             <a:r>
               <a:rPr kumimoji="1" lang="zh-CN" altLang="en-US" dirty="0"/>
-              <a:t>对数组元素赋值也简单，类似的语法：</a:t>
+              <a:t>对数组元素赋值也简单，采用类似的语法：</a:t>
             </a:r>
             <a:endParaRPr kumimoji="1" lang="en-US" altLang="zh-CN" dirty="0"/>
           </a:p>
@@ -2519,7 +2563,15 @@
           <a:p>
             <a:r>
               <a:rPr kumimoji="1" lang="zh-CN" altLang="en-US" dirty="0"/>
-              <a:t>例如，我们把第一个元素修改为</a:t>
+              <a:t>例如，我们把第一个元素，也就是索引为</a:t>
+            </a:r>
+            <a:r>
+              <a:rPr kumimoji="1" lang="en-US" altLang="zh-CN" dirty="0"/>
+              <a:t>0</a:t>
+            </a:r>
+            <a:r>
+              <a:rPr kumimoji="1" lang="zh-CN" altLang="en-US" dirty="0"/>
+              <a:t>的元素，修改为</a:t>
             </a:r>
             <a:r>
               <a:rPr kumimoji="1" lang="en-US" altLang="zh-CN" dirty="0"/>

</xml_diff>